<commit_message>
increased font for Fig. 2
</commit_message>
<xml_diff>
--- a/img/subnetwork-source.pptx
+++ b/img/subnetwork-source.pptx
@@ -262,7 +262,7 @@
           <a:p>
             <a:fld id="{06D6A9A0-8F7D-904F-8BB3-D7558471D569}" type="datetimeFigureOut">
               <a:rPr lang="en-GB" smtClean="0"/>
-              <a:t>16/05/2022</a:t>
+              <a:t>25/10/2022</a:t>
             </a:fld>
             <a:endParaRPr lang="en-GB"/>
           </a:p>
@@ -460,7 +460,7 @@
           <a:p>
             <a:fld id="{06D6A9A0-8F7D-904F-8BB3-D7558471D569}" type="datetimeFigureOut">
               <a:rPr lang="en-GB" smtClean="0"/>
-              <a:t>16/05/2022</a:t>
+              <a:t>25/10/2022</a:t>
             </a:fld>
             <a:endParaRPr lang="en-GB"/>
           </a:p>
@@ -668,7 +668,7 @@
           <a:p>
             <a:fld id="{06D6A9A0-8F7D-904F-8BB3-D7558471D569}" type="datetimeFigureOut">
               <a:rPr lang="en-GB" smtClean="0"/>
-              <a:t>16/05/2022</a:t>
+              <a:t>25/10/2022</a:t>
             </a:fld>
             <a:endParaRPr lang="en-GB"/>
           </a:p>
@@ -866,7 +866,7 @@
           <a:p>
             <a:fld id="{06D6A9A0-8F7D-904F-8BB3-D7558471D569}" type="datetimeFigureOut">
               <a:rPr lang="en-GB" smtClean="0"/>
-              <a:t>16/05/2022</a:t>
+              <a:t>25/10/2022</a:t>
             </a:fld>
             <a:endParaRPr lang="en-GB"/>
           </a:p>
@@ -1141,7 +1141,7 @@
           <a:p>
             <a:fld id="{06D6A9A0-8F7D-904F-8BB3-D7558471D569}" type="datetimeFigureOut">
               <a:rPr lang="en-GB" smtClean="0"/>
-              <a:t>16/05/2022</a:t>
+              <a:t>25/10/2022</a:t>
             </a:fld>
             <a:endParaRPr lang="en-GB"/>
           </a:p>
@@ -1406,7 +1406,7 @@
           <a:p>
             <a:fld id="{06D6A9A0-8F7D-904F-8BB3-D7558471D569}" type="datetimeFigureOut">
               <a:rPr lang="en-GB" smtClean="0"/>
-              <a:t>16/05/2022</a:t>
+              <a:t>25/10/2022</a:t>
             </a:fld>
             <a:endParaRPr lang="en-GB"/>
           </a:p>
@@ -1818,7 +1818,7 @@
           <a:p>
             <a:fld id="{06D6A9A0-8F7D-904F-8BB3-D7558471D569}" type="datetimeFigureOut">
               <a:rPr lang="en-GB" smtClean="0"/>
-              <a:t>16/05/2022</a:t>
+              <a:t>25/10/2022</a:t>
             </a:fld>
             <a:endParaRPr lang="en-GB"/>
           </a:p>
@@ -1959,7 +1959,7 @@
           <a:p>
             <a:fld id="{06D6A9A0-8F7D-904F-8BB3-D7558471D569}" type="datetimeFigureOut">
               <a:rPr lang="en-GB" smtClean="0"/>
-              <a:t>16/05/2022</a:t>
+              <a:t>25/10/2022</a:t>
             </a:fld>
             <a:endParaRPr lang="en-GB"/>
           </a:p>
@@ -2072,7 +2072,7 @@
           <a:p>
             <a:fld id="{06D6A9A0-8F7D-904F-8BB3-D7558471D569}" type="datetimeFigureOut">
               <a:rPr lang="en-GB" smtClean="0"/>
-              <a:t>16/05/2022</a:t>
+              <a:t>25/10/2022</a:t>
             </a:fld>
             <a:endParaRPr lang="en-GB"/>
           </a:p>
@@ -2383,7 +2383,7 @@
           <a:p>
             <a:fld id="{06D6A9A0-8F7D-904F-8BB3-D7558471D569}" type="datetimeFigureOut">
               <a:rPr lang="en-GB" smtClean="0"/>
-              <a:t>16/05/2022</a:t>
+              <a:t>25/10/2022</a:t>
             </a:fld>
             <a:endParaRPr lang="en-GB"/>
           </a:p>
@@ -2671,7 +2671,7 @@
           <a:p>
             <a:fld id="{06D6A9A0-8F7D-904F-8BB3-D7558471D569}" type="datetimeFigureOut">
               <a:rPr lang="en-GB" smtClean="0"/>
-              <a:t>16/05/2022</a:t>
+              <a:t>25/10/2022</a:t>
             </a:fld>
             <a:endParaRPr lang="en-GB"/>
           </a:p>
@@ -2912,7 +2912,7 @@
           <a:p>
             <a:fld id="{06D6A9A0-8F7D-904F-8BB3-D7558471D569}" type="datetimeFigureOut">
               <a:rPr lang="en-GB" smtClean="0"/>
-              <a:t>16/05/2022</a:t>
+              <a:t>25/10/2022</a:t>
             </a:fld>
             <a:endParaRPr lang="en-GB"/>
           </a:p>
@@ -20356,8 +20356,8 @@
         </p:nvSpPr>
         <p:spPr>
           <a:xfrm>
-            <a:off x="1370058" y="1980851"/>
-            <a:ext cx="2549929" cy="338554"/>
+            <a:off x="1073952" y="1980851"/>
+            <a:ext cx="3142142" cy="400110"/>
           </a:xfrm>
           <a:prstGeom prst="rect">
             <a:avLst/>
@@ -20372,2132 +20372,2090 @@
           <a:p>
             <a:pPr algn="ctr"/>
             <a:r>
-              <a:rPr lang="en-GB" sz="1600" b="1" dirty="0"/>
+              <a:rPr lang="en-GB" sz="2000" b="1" dirty="0"/>
               <a:t> Service  Discovery Network</a:t>
             </a:r>
           </a:p>
         </p:txBody>
       </p:sp>
-      <p:grpSp>
-        <p:nvGrpSpPr>
-          <p:cNvPr id="167" name="Group 166">
+      <p:sp>
+        <p:nvSpPr>
+          <p:cNvPr id="23" name="Oval 22">
             <a:extLst>
               <a:ext uri="{FF2B5EF4-FFF2-40B4-BE49-F238E27FC236}">
-                <a16:creationId xmlns:a16="http://schemas.microsoft.com/office/drawing/2014/main" id="{2AD56E6A-0B0D-52F8-BB65-7ED6442A6359}"/>
+                <a16:creationId xmlns:a16="http://schemas.microsoft.com/office/drawing/2014/main" id="{59A3D88D-0D1D-4237-CDA4-1C8548ACDEFF}"/>
               </a:ext>
             </a:extLst>
           </p:cNvPr>
-          <p:cNvGrpSpPr/>
+          <p:cNvSpPr/>
           <p:nvPr/>
-        </p:nvGrpSpPr>
-        <p:grpSpPr>
+        </p:nvSpPr>
+        <p:spPr>
           <a:xfrm>
-            <a:off x="6005754" y="2392469"/>
-            <a:ext cx="4676079" cy="1654717"/>
-            <a:chOff x="3209250" y="2225547"/>
-            <a:chExt cx="4676079" cy="1654717"/>
+            <a:off x="6989814" y="2753962"/>
+            <a:ext cx="167425" cy="167425"/>
           </a:xfrm>
-        </p:grpSpPr>
-        <p:sp>
-          <p:nvSpPr>
-            <p:cNvPr id="23" name="Oval 22">
-              <a:extLst>
-                <a:ext uri="{FF2B5EF4-FFF2-40B4-BE49-F238E27FC236}">
-                  <a16:creationId xmlns:a16="http://schemas.microsoft.com/office/drawing/2014/main" id="{59A3D88D-0D1D-4237-CDA4-1C8548ACDEFF}"/>
-                </a:ext>
-              </a:extLst>
-            </p:cNvPr>
-            <p:cNvSpPr/>
-            <p:nvPr/>
-          </p:nvSpPr>
-          <p:spPr>
-            <a:xfrm>
-              <a:off x="4249065" y="2587040"/>
-              <a:ext cx="167425" cy="167425"/>
-            </a:xfrm>
-            <a:prstGeom prst="ellipse">
-              <a:avLst/>
-            </a:prstGeom>
+          <a:prstGeom prst="ellipse">
+            <a:avLst/>
+          </a:prstGeom>
+          <a:solidFill>
+            <a:schemeClr val="tx1"/>
+          </a:solidFill>
+        </p:spPr>
+        <p:style>
+          <a:lnRef idx="2">
+            <a:schemeClr val="accent1">
+              <a:shade val="50000"/>
+            </a:schemeClr>
+          </a:lnRef>
+          <a:fillRef idx="1">
+            <a:schemeClr val="accent1"/>
+          </a:fillRef>
+          <a:effectRef idx="0">
+            <a:schemeClr val="accent1"/>
+          </a:effectRef>
+          <a:fontRef idx="minor">
+            <a:schemeClr val="lt1"/>
+          </a:fontRef>
+        </p:style>
+        <p:txBody>
+          <a:bodyPr rtlCol="0" anchor="ctr"/>
+          <a:lstStyle/>
+          <a:p>
+            <a:pPr algn="ctr"/>
+            <a:endParaRPr lang="en-GB"/>
+          </a:p>
+        </p:txBody>
+      </p:sp>
+      <p:sp>
+        <p:nvSpPr>
+          <p:cNvPr id="24" name="Oval 23">
+            <a:extLst>
+              <a:ext uri="{FF2B5EF4-FFF2-40B4-BE49-F238E27FC236}">
+                <a16:creationId xmlns:a16="http://schemas.microsoft.com/office/drawing/2014/main" id="{18E16A3B-DEED-3CAD-AFAF-CE99257461D8}"/>
+              </a:ext>
+            </a:extLst>
+          </p:cNvPr>
+          <p:cNvSpPr/>
+          <p:nvPr/>
+        </p:nvSpPr>
+        <p:spPr>
+          <a:xfrm>
+            <a:off x="7333871" y="3164471"/>
+            <a:ext cx="167425" cy="167425"/>
+          </a:xfrm>
+          <a:prstGeom prst="ellipse">
+            <a:avLst/>
+          </a:prstGeom>
+          <a:solidFill>
+            <a:schemeClr val="tx1"/>
+          </a:solidFill>
+        </p:spPr>
+        <p:style>
+          <a:lnRef idx="2">
+            <a:schemeClr val="accent1">
+              <a:shade val="50000"/>
+            </a:schemeClr>
+          </a:lnRef>
+          <a:fillRef idx="1">
+            <a:schemeClr val="accent1"/>
+          </a:fillRef>
+          <a:effectRef idx="0">
+            <a:schemeClr val="accent1"/>
+          </a:effectRef>
+          <a:fontRef idx="minor">
+            <a:schemeClr val="lt1"/>
+          </a:fontRef>
+        </p:style>
+        <p:txBody>
+          <a:bodyPr rtlCol="0" anchor="ctr"/>
+          <a:lstStyle/>
+          <a:p>
+            <a:pPr algn="ctr"/>
+            <a:endParaRPr lang="en-GB"/>
+          </a:p>
+        </p:txBody>
+      </p:sp>
+      <p:sp>
+        <p:nvSpPr>
+          <p:cNvPr id="25" name="Oval 24">
+            <a:extLst>
+              <a:ext uri="{FF2B5EF4-FFF2-40B4-BE49-F238E27FC236}">
+                <a16:creationId xmlns:a16="http://schemas.microsoft.com/office/drawing/2014/main" id="{06803BDE-6EA7-AC85-A6F6-A62D8D313386}"/>
+              </a:ext>
+            </a:extLst>
+          </p:cNvPr>
+          <p:cNvSpPr/>
+          <p:nvPr/>
+        </p:nvSpPr>
+        <p:spPr>
+          <a:xfrm>
+            <a:off x="6621242" y="3498597"/>
+            <a:ext cx="167425" cy="167425"/>
+          </a:xfrm>
+          <a:prstGeom prst="ellipse">
+            <a:avLst/>
+          </a:prstGeom>
+          <a:solidFill>
+            <a:schemeClr val="tx1"/>
+          </a:solidFill>
+        </p:spPr>
+        <p:style>
+          <a:lnRef idx="2">
+            <a:schemeClr val="accent1">
+              <a:shade val="50000"/>
+            </a:schemeClr>
+          </a:lnRef>
+          <a:fillRef idx="1">
+            <a:schemeClr val="accent1"/>
+          </a:fillRef>
+          <a:effectRef idx="0">
+            <a:schemeClr val="accent1"/>
+          </a:effectRef>
+          <a:fontRef idx="minor">
+            <a:schemeClr val="lt1"/>
+          </a:fontRef>
+        </p:style>
+        <p:txBody>
+          <a:bodyPr rtlCol="0" anchor="ctr"/>
+          <a:lstStyle/>
+          <a:p>
+            <a:pPr algn="ctr"/>
+            <a:endParaRPr lang="en-GB"/>
+          </a:p>
+        </p:txBody>
+      </p:sp>
+      <p:sp>
+        <p:nvSpPr>
+          <p:cNvPr id="26" name="Oval 25">
+            <a:extLst>
+              <a:ext uri="{FF2B5EF4-FFF2-40B4-BE49-F238E27FC236}">
+                <a16:creationId xmlns:a16="http://schemas.microsoft.com/office/drawing/2014/main" id="{B3760D86-B7C8-BE31-2695-E4B8251C52D9}"/>
+              </a:ext>
+            </a:extLst>
+          </p:cNvPr>
+          <p:cNvSpPr/>
+          <p:nvPr/>
+        </p:nvSpPr>
+        <p:spPr>
+          <a:xfrm>
+            <a:off x="6989815" y="3879761"/>
+            <a:ext cx="167425" cy="167425"/>
+          </a:xfrm>
+          <a:prstGeom prst="ellipse">
+            <a:avLst/>
+          </a:prstGeom>
+          <a:solidFill>
+            <a:schemeClr val="tx1"/>
+          </a:solidFill>
+        </p:spPr>
+        <p:style>
+          <a:lnRef idx="2">
+            <a:schemeClr val="accent1">
+              <a:shade val="50000"/>
+            </a:schemeClr>
+          </a:lnRef>
+          <a:fillRef idx="1">
+            <a:schemeClr val="accent1"/>
+          </a:fillRef>
+          <a:effectRef idx="0">
+            <a:schemeClr val="accent1"/>
+          </a:effectRef>
+          <a:fontRef idx="minor">
+            <a:schemeClr val="lt1"/>
+          </a:fontRef>
+        </p:style>
+        <p:txBody>
+          <a:bodyPr rtlCol="0" anchor="ctr"/>
+          <a:lstStyle/>
+          <a:p>
+            <a:pPr algn="ctr"/>
+            <a:endParaRPr lang="en-GB"/>
+          </a:p>
+        </p:txBody>
+      </p:sp>
+      <p:sp>
+        <p:nvSpPr>
+          <p:cNvPr id="27" name="Oval 26">
+            <a:extLst>
+              <a:ext uri="{FF2B5EF4-FFF2-40B4-BE49-F238E27FC236}">
+                <a16:creationId xmlns:a16="http://schemas.microsoft.com/office/drawing/2014/main" id="{4C857D8E-CF1D-4F89-C2C7-36F2A2C5D70F}"/>
+              </a:ext>
+            </a:extLst>
+          </p:cNvPr>
+          <p:cNvSpPr/>
+          <p:nvPr/>
+        </p:nvSpPr>
+        <p:spPr>
+          <a:xfrm>
+            <a:off x="6222454" y="3080758"/>
+            <a:ext cx="167425" cy="167425"/>
+          </a:xfrm>
+          <a:prstGeom prst="ellipse">
+            <a:avLst/>
+          </a:prstGeom>
+          <a:solidFill>
+            <a:schemeClr val="tx1"/>
+          </a:solidFill>
+        </p:spPr>
+        <p:style>
+          <a:lnRef idx="2">
+            <a:schemeClr val="accent1">
+              <a:shade val="50000"/>
+            </a:schemeClr>
+          </a:lnRef>
+          <a:fillRef idx="1">
+            <a:schemeClr val="accent1"/>
+          </a:fillRef>
+          <a:effectRef idx="0">
+            <a:schemeClr val="accent1"/>
+          </a:effectRef>
+          <a:fontRef idx="minor">
+            <a:schemeClr val="lt1"/>
+          </a:fontRef>
+        </p:style>
+        <p:txBody>
+          <a:bodyPr rtlCol="0" anchor="ctr"/>
+          <a:lstStyle/>
+          <a:p>
+            <a:pPr algn="ctr"/>
+            <a:endParaRPr lang="en-GB"/>
+          </a:p>
+        </p:txBody>
+      </p:sp>
+      <p:cxnSp>
+        <p:nvCxnSpPr>
+          <p:cNvPr id="29" name="Straight Connector 28">
+            <a:extLst>
+              <a:ext uri="{FF2B5EF4-FFF2-40B4-BE49-F238E27FC236}">
+                <a16:creationId xmlns:a16="http://schemas.microsoft.com/office/drawing/2014/main" id="{3E414B73-A764-AE94-EB7F-43E50A1896A0}"/>
+              </a:ext>
+            </a:extLst>
+          </p:cNvPr>
+          <p:cNvCxnSpPr>
+            <a:cxnSpLocks/>
+            <a:stCxn id="27" idx="5"/>
+            <a:endCxn id="25" idx="1"/>
+          </p:cNvCxnSpPr>
+          <p:nvPr/>
+        </p:nvCxnSpPr>
+        <p:spPr>
+          <a:xfrm>
+            <a:off x="6365360" y="3223664"/>
+            <a:ext cx="280401" cy="299452"/>
+          </a:xfrm>
+          <a:prstGeom prst="line">
+            <a:avLst/>
+          </a:prstGeom>
+          <a:ln w="12700"/>
+        </p:spPr>
+        <p:style>
+          <a:lnRef idx="1">
+            <a:schemeClr val="accent1"/>
+          </a:lnRef>
+          <a:fillRef idx="0">
+            <a:schemeClr val="accent1"/>
+          </a:fillRef>
+          <a:effectRef idx="0">
+            <a:schemeClr val="accent1"/>
+          </a:effectRef>
+          <a:fontRef idx="minor">
+            <a:schemeClr val="tx1"/>
+          </a:fontRef>
+        </p:style>
+      </p:cxnSp>
+      <p:cxnSp>
+        <p:nvCxnSpPr>
+          <p:cNvPr id="33" name="Straight Connector 32">
+            <a:extLst>
+              <a:ext uri="{FF2B5EF4-FFF2-40B4-BE49-F238E27FC236}">
+                <a16:creationId xmlns:a16="http://schemas.microsoft.com/office/drawing/2014/main" id="{F414F055-3E79-C09D-22D9-F94BFA76AD2C}"/>
+              </a:ext>
+            </a:extLst>
+          </p:cNvPr>
+          <p:cNvCxnSpPr>
+            <a:cxnSpLocks/>
+            <a:stCxn id="24" idx="1"/>
+            <a:endCxn id="23" idx="5"/>
+          </p:cNvCxnSpPr>
+          <p:nvPr/>
+        </p:nvCxnSpPr>
+        <p:spPr>
+          <a:xfrm flipH="1" flipV="1">
+            <a:off x="7132720" y="2896868"/>
+            <a:ext cx="225670" cy="292122"/>
+          </a:xfrm>
+          <a:prstGeom prst="line">
+            <a:avLst/>
+          </a:prstGeom>
+          <a:ln w="12700"/>
+        </p:spPr>
+        <p:style>
+          <a:lnRef idx="1">
+            <a:schemeClr val="accent1"/>
+          </a:lnRef>
+          <a:fillRef idx="0">
+            <a:schemeClr val="accent1"/>
+          </a:fillRef>
+          <a:effectRef idx="0">
+            <a:schemeClr val="accent1"/>
+          </a:effectRef>
+          <a:fontRef idx="minor">
+            <a:schemeClr val="tx1"/>
+          </a:fontRef>
+        </p:style>
+      </p:cxnSp>
+      <p:cxnSp>
+        <p:nvCxnSpPr>
+          <p:cNvPr id="37" name="Straight Connector 36">
+            <a:extLst>
+              <a:ext uri="{FF2B5EF4-FFF2-40B4-BE49-F238E27FC236}">
+                <a16:creationId xmlns:a16="http://schemas.microsoft.com/office/drawing/2014/main" id="{AECD52E1-F626-7286-051F-36DA72F14A48}"/>
+              </a:ext>
+            </a:extLst>
+          </p:cNvPr>
+          <p:cNvCxnSpPr>
+            <a:cxnSpLocks/>
+            <a:stCxn id="26" idx="1"/>
+            <a:endCxn id="25" idx="5"/>
+          </p:cNvCxnSpPr>
+          <p:nvPr/>
+        </p:nvCxnSpPr>
+        <p:spPr>
+          <a:xfrm flipH="1" flipV="1">
+            <a:off x="6764148" y="3641503"/>
+            <a:ext cx="250186" cy="262777"/>
+          </a:xfrm>
+          <a:prstGeom prst="line">
+            <a:avLst/>
+          </a:prstGeom>
+          <a:ln w="12700"/>
+        </p:spPr>
+        <p:style>
+          <a:lnRef idx="1">
+            <a:schemeClr val="accent1"/>
+          </a:lnRef>
+          <a:fillRef idx="0">
+            <a:schemeClr val="accent1"/>
+          </a:fillRef>
+          <a:effectRef idx="0">
+            <a:schemeClr val="accent1"/>
+          </a:effectRef>
+          <a:fontRef idx="minor">
+            <a:schemeClr val="tx1"/>
+          </a:fontRef>
+        </p:style>
+      </p:cxnSp>
+      <p:cxnSp>
+        <p:nvCxnSpPr>
+          <p:cNvPr id="39" name="Straight Connector 38">
+            <a:extLst>
+              <a:ext uri="{FF2B5EF4-FFF2-40B4-BE49-F238E27FC236}">
+                <a16:creationId xmlns:a16="http://schemas.microsoft.com/office/drawing/2014/main" id="{F6A9B73D-87CD-DC7A-1006-C081A7862114}"/>
+              </a:ext>
+            </a:extLst>
+          </p:cNvPr>
+          <p:cNvCxnSpPr>
+            <a:cxnSpLocks/>
+            <a:stCxn id="25" idx="6"/>
+            <a:endCxn id="24" idx="3"/>
+          </p:cNvCxnSpPr>
+          <p:nvPr/>
+        </p:nvCxnSpPr>
+        <p:spPr>
+          <a:xfrm flipV="1">
+            <a:off x="6788667" y="3307377"/>
+            <a:ext cx="569723" cy="274933"/>
+          </a:xfrm>
+          <a:prstGeom prst="line">
+            <a:avLst/>
+          </a:prstGeom>
+          <a:ln w="12700"/>
+        </p:spPr>
+        <p:style>
+          <a:lnRef idx="1">
+            <a:schemeClr val="accent1"/>
+          </a:lnRef>
+          <a:fillRef idx="0">
+            <a:schemeClr val="accent1"/>
+          </a:fillRef>
+          <a:effectRef idx="0">
+            <a:schemeClr val="accent1"/>
+          </a:effectRef>
+          <a:fontRef idx="minor">
+            <a:schemeClr val="tx1"/>
+          </a:fontRef>
+        </p:style>
+      </p:cxnSp>
+      <p:cxnSp>
+        <p:nvCxnSpPr>
+          <p:cNvPr id="63" name="Straight Connector 62">
+            <a:extLst>
+              <a:ext uri="{FF2B5EF4-FFF2-40B4-BE49-F238E27FC236}">
+                <a16:creationId xmlns:a16="http://schemas.microsoft.com/office/drawing/2014/main" id="{C73326AE-2E5E-E2DD-E7EB-E8A419BEE957}"/>
+              </a:ext>
+            </a:extLst>
+          </p:cNvPr>
+          <p:cNvCxnSpPr>
+            <a:cxnSpLocks/>
+            <a:stCxn id="26" idx="7"/>
+            <a:endCxn id="23" idx="4"/>
+          </p:cNvCxnSpPr>
+          <p:nvPr/>
+        </p:nvCxnSpPr>
+        <p:spPr>
+          <a:xfrm flipH="1" flipV="1">
+            <a:off x="7073527" y="2921387"/>
+            <a:ext cx="59194" cy="982893"/>
+          </a:xfrm>
+          <a:prstGeom prst="line">
+            <a:avLst/>
+          </a:prstGeom>
+          <a:ln w="12700"/>
+        </p:spPr>
+        <p:style>
+          <a:lnRef idx="1">
+            <a:schemeClr val="accent1"/>
+          </a:lnRef>
+          <a:fillRef idx="0">
+            <a:schemeClr val="accent1"/>
+          </a:fillRef>
+          <a:effectRef idx="0">
+            <a:schemeClr val="accent1"/>
+          </a:effectRef>
+          <a:fontRef idx="minor">
+            <a:schemeClr val="tx1"/>
+          </a:fontRef>
+        </p:style>
+      </p:cxnSp>
+      <p:cxnSp>
+        <p:nvCxnSpPr>
+          <p:cNvPr id="66" name="Straight Connector 65">
+            <a:extLst>
+              <a:ext uri="{FF2B5EF4-FFF2-40B4-BE49-F238E27FC236}">
+                <a16:creationId xmlns:a16="http://schemas.microsoft.com/office/drawing/2014/main" id="{681FEC13-CF79-BA67-E2C2-179737F0D63C}"/>
+              </a:ext>
+            </a:extLst>
+          </p:cNvPr>
+          <p:cNvCxnSpPr>
+            <a:cxnSpLocks/>
+            <a:stCxn id="27" idx="7"/>
+            <a:endCxn id="24" idx="2"/>
+          </p:cNvCxnSpPr>
+          <p:nvPr/>
+        </p:nvCxnSpPr>
+        <p:spPr>
+          <a:xfrm>
+            <a:off x="6365360" y="3105277"/>
+            <a:ext cx="968511" cy="142907"/>
+          </a:xfrm>
+          <a:prstGeom prst="line">
+            <a:avLst/>
+          </a:prstGeom>
+          <a:ln w="12700"/>
+        </p:spPr>
+        <p:style>
+          <a:lnRef idx="1">
+            <a:schemeClr val="accent1"/>
+          </a:lnRef>
+          <a:fillRef idx="0">
+            <a:schemeClr val="accent1"/>
+          </a:fillRef>
+          <a:effectRef idx="0">
+            <a:schemeClr val="accent1"/>
+          </a:effectRef>
+          <a:fontRef idx="minor">
+            <a:schemeClr val="tx1"/>
+          </a:fontRef>
+        </p:style>
+      </p:cxnSp>
+      <p:sp>
+        <p:nvSpPr>
+          <p:cNvPr id="69" name="TextBox 68">
+            <a:extLst>
+              <a:ext uri="{FF2B5EF4-FFF2-40B4-BE49-F238E27FC236}">
+                <a16:creationId xmlns:a16="http://schemas.microsoft.com/office/drawing/2014/main" id="{D96C88DB-C047-C4CD-D1A3-D9630F51EBD5}"/>
+              </a:ext>
+            </a:extLst>
+          </p:cNvPr>
+          <p:cNvSpPr txBox="1"/>
+          <p:nvPr/>
+        </p:nvSpPr>
+        <p:spPr>
+          <a:xfrm>
+            <a:off x="5964340" y="2390889"/>
+            <a:ext cx="1770549" cy="338554"/>
+          </a:xfrm>
+          <a:prstGeom prst="rect">
+            <a:avLst/>
+          </a:prstGeom>
+          <a:noFill/>
+        </p:spPr>
+        <p:txBody>
+          <a:bodyPr wrap="none" rtlCol="0">
+            <a:spAutoFit/>
+          </a:bodyPr>
+          <a:lstStyle/>
+          <a:p>
+            <a:r>
+              <a:rPr lang="en-GB" sz="1600" i="1" dirty="0"/>
+              <a:t>App-1 sub-network</a:t>
+            </a:r>
+          </a:p>
+        </p:txBody>
+      </p:sp>
+      <p:sp>
+        <p:nvSpPr>
+          <p:cNvPr id="70" name="Oval 69">
+            <a:extLst>
+              <a:ext uri="{FF2B5EF4-FFF2-40B4-BE49-F238E27FC236}">
+                <a16:creationId xmlns:a16="http://schemas.microsoft.com/office/drawing/2014/main" id="{4019D79F-7E38-6FDE-949D-C4103EF0A13C}"/>
+              </a:ext>
+            </a:extLst>
+          </p:cNvPr>
+          <p:cNvSpPr/>
+          <p:nvPr/>
+        </p:nvSpPr>
+        <p:spPr>
+          <a:xfrm>
+            <a:off x="8583828" y="2796838"/>
+            <a:ext cx="167425" cy="167425"/>
+          </a:xfrm>
+          <a:prstGeom prst="ellipse">
+            <a:avLst/>
+          </a:prstGeom>
+          <a:pattFill prst="wdUpDiag">
+            <a:fgClr>
+              <a:srgbClr val="00B050"/>
+            </a:fgClr>
+            <a:bgClr>
+              <a:schemeClr val="bg1"/>
+            </a:bgClr>
+          </a:pattFill>
+        </p:spPr>
+        <p:style>
+          <a:lnRef idx="2">
+            <a:schemeClr val="accent1">
+              <a:shade val="50000"/>
+            </a:schemeClr>
+          </a:lnRef>
+          <a:fillRef idx="1">
+            <a:schemeClr val="accent1"/>
+          </a:fillRef>
+          <a:effectRef idx="0">
+            <a:schemeClr val="accent1"/>
+          </a:effectRef>
+          <a:fontRef idx="minor">
+            <a:schemeClr val="lt1"/>
+          </a:fontRef>
+        </p:style>
+        <p:txBody>
+          <a:bodyPr rtlCol="0" anchor="ctr"/>
+          <a:lstStyle/>
+          <a:p>
+            <a:pPr algn="ctr"/>
+            <a:endParaRPr lang="en-GB"/>
+          </a:p>
+        </p:txBody>
+      </p:sp>
+      <p:sp>
+        <p:nvSpPr>
+          <p:cNvPr id="71" name="Oval 70">
+            <a:extLst>
+              <a:ext uri="{FF2B5EF4-FFF2-40B4-BE49-F238E27FC236}">
+                <a16:creationId xmlns:a16="http://schemas.microsoft.com/office/drawing/2014/main" id="{49CECF9E-916C-7687-55A3-3C447364DE7E}"/>
+              </a:ext>
+            </a:extLst>
+          </p:cNvPr>
+          <p:cNvSpPr/>
+          <p:nvPr/>
+        </p:nvSpPr>
+        <p:spPr>
+          <a:xfrm>
+            <a:off x="9055158" y="3199890"/>
+            <a:ext cx="167425" cy="167425"/>
+          </a:xfrm>
+          <a:prstGeom prst="ellipse">
+            <a:avLst/>
+          </a:prstGeom>
+          <a:pattFill prst="wdUpDiag">
+            <a:fgClr>
+              <a:srgbClr val="00B050"/>
+            </a:fgClr>
+            <a:bgClr>
+              <a:schemeClr val="bg1"/>
+            </a:bgClr>
+          </a:pattFill>
+        </p:spPr>
+        <p:style>
+          <a:lnRef idx="2">
+            <a:schemeClr val="accent1">
+              <a:shade val="50000"/>
+            </a:schemeClr>
+          </a:lnRef>
+          <a:fillRef idx="1">
+            <a:schemeClr val="accent1"/>
+          </a:fillRef>
+          <a:effectRef idx="0">
+            <a:schemeClr val="accent1"/>
+          </a:effectRef>
+          <a:fontRef idx="minor">
+            <a:schemeClr val="lt1"/>
+          </a:fontRef>
+        </p:style>
+        <p:txBody>
+          <a:bodyPr rtlCol="0" anchor="ctr"/>
+          <a:lstStyle/>
+          <a:p>
+            <a:pPr algn="ctr"/>
+            <a:endParaRPr lang="en-GB"/>
+          </a:p>
+        </p:txBody>
+      </p:sp>
+      <p:sp>
+        <p:nvSpPr>
+          <p:cNvPr id="72" name="Oval 71">
+            <a:extLst>
+              <a:ext uri="{FF2B5EF4-FFF2-40B4-BE49-F238E27FC236}">
+                <a16:creationId xmlns:a16="http://schemas.microsoft.com/office/drawing/2014/main" id="{2A85C9B8-FA8B-1776-5DB2-4A810B805AE8}"/>
+              </a:ext>
+            </a:extLst>
+          </p:cNvPr>
+          <p:cNvSpPr/>
+          <p:nvPr/>
+        </p:nvSpPr>
+        <p:spPr>
+          <a:xfrm>
+            <a:off x="8094208" y="3215966"/>
+            <a:ext cx="167425" cy="167425"/>
+          </a:xfrm>
+          <a:prstGeom prst="ellipse">
+            <a:avLst/>
+          </a:prstGeom>
+          <a:pattFill prst="wdUpDiag">
+            <a:fgClr>
+              <a:srgbClr val="00B050"/>
+            </a:fgClr>
+            <a:bgClr>
+              <a:schemeClr val="bg1"/>
+            </a:bgClr>
+          </a:pattFill>
+        </p:spPr>
+        <p:style>
+          <a:lnRef idx="2">
+            <a:schemeClr val="accent1">
+              <a:shade val="50000"/>
+            </a:schemeClr>
+          </a:lnRef>
+          <a:fillRef idx="1">
+            <a:schemeClr val="accent1"/>
+          </a:fillRef>
+          <a:effectRef idx="0">
+            <a:schemeClr val="accent1"/>
+          </a:effectRef>
+          <a:fontRef idx="minor">
+            <a:schemeClr val="lt1"/>
+          </a:fontRef>
+        </p:style>
+        <p:txBody>
+          <a:bodyPr rtlCol="0" anchor="ctr"/>
+          <a:lstStyle/>
+          <a:p>
+            <a:pPr algn="ctr"/>
+            <a:endParaRPr lang="en-GB"/>
+          </a:p>
+        </p:txBody>
+      </p:sp>
+      <p:sp>
+        <p:nvSpPr>
+          <p:cNvPr id="73" name="Oval 72">
+            <a:extLst>
+              <a:ext uri="{FF2B5EF4-FFF2-40B4-BE49-F238E27FC236}">
+                <a16:creationId xmlns:a16="http://schemas.microsoft.com/office/drawing/2014/main" id="{722A0B82-5E22-6816-6476-8BE83CCD6EB5}"/>
+              </a:ext>
+            </a:extLst>
+          </p:cNvPr>
+          <p:cNvSpPr/>
+          <p:nvPr/>
+        </p:nvSpPr>
+        <p:spPr>
+          <a:xfrm>
+            <a:off x="8070304" y="3820567"/>
+            <a:ext cx="167425" cy="167425"/>
+          </a:xfrm>
+          <a:prstGeom prst="ellipse">
+            <a:avLst/>
+          </a:prstGeom>
+          <a:pattFill prst="wdUpDiag">
+            <a:fgClr>
+              <a:srgbClr val="00B050"/>
+            </a:fgClr>
+            <a:bgClr>
+              <a:schemeClr val="bg1"/>
+            </a:bgClr>
+          </a:pattFill>
+        </p:spPr>
+        <p:style>
+          <a:lnRef idx="2">
+            <a:schemeClr val="accent1">
+              <a:shade val="50000"/>
+            </a:schemeClr>
+          </a:lnRef>
+          <a:fillRef idx="1">
+            <a:schemeClr val="accent1"/>
+          </a:fillRef>
+          <a:effectRef idx="0">
+            <a:schemeClr val="accent1"/>
+          </a:effectRef>
+          <a:fontRef idx="minor">
+            <a:schemeClr val="lt1"/>
+          </a:fontRef>
+        </p:style>
+        <p:txBody>
+          <a:bodyPr rtlCol="0" anchor="ctr"/>
+          <a:lstStyle/>
+          <a:p>
+            <a:pPr algn="ctr"/>
+            <a:endParaRPr lang="en-GB"/>
+          </a:p>
+        </p:txBody>
+      </p:sp>
+      <p:sp>
+        <p:nvSpPr>
+          <p:cNvPr id="74" name="Oval 73">
+            <a:extLst>
+              <a:ext uri="{FF2B5EF4-FFF2-40B4-BE49-F238E27FC236}">
+                <a16:creationId xmlns:a16="http://schemas.microsoft.com/office/drawing/2014/main" id="{A050D133-A625-12EF-5D45-90B32726439A}"/>
+              </a:ext>
+            </a:extLst>
+          </p:cNvPr>
+          <p:cNvSpPr/>
+          <p:nvPr/>
+        </p:nvSpPr>
+        <p:spPr>
+          <a:xfrm>
+            <a:off x="8745442" y="3795978"/>
+            <a:ext cx="167425" cy="167425"/>
+          </a:xfrm>
+          <a:prstGeom prst="ellipse">
+            <a:avLst/>
+          </a:prstGeom>
+          <a:pattFill prst="wdUpDiag">
+            <a:fgClr>
+              <a:srgbClr val="00B050"/>
+            </a:fgClr>
+            <a:bgClr>
+              <a:schemeClr val="bg1"/>
+            </a:bgClr>
+          </a:pattFill>
+        </p:spPr>
+        <p:style>
+          <a:lnRef idx="2">
+            <a:schemeClr val="accent1">
+              <a:shade val="50000"/>
+            </a:schemeClr>
+          </a:lnRef>
+          <a:fillRef idx="1">
+            <a:schemeClr val="accent1"/>
+          </a:fillRef>
+          <a:effectRef idx="0">
+            <a:schemeClr val="accent1"/>
+          </a:effectRef>
+          <a:fontRef idx="minor">
+            <a:schemeClr val="lt1"/>
+          </a:fontRef>
+        </p:style>
+        <p:txBody>
+          <a:bodyPr rtlCol="0" anchor="ctr"/>
+          <a:lstStyle/>
+          <a:p>
+            <a:pPr algn="ctr"/>
+            <a:endParaRPr lang="en-GB"/>
+          </a:p>
+        </p:txBody>
+      </p:sp>
+      <p:sp>
+        <p:nvSpPr>
+          <p:cNvPr id="75" name="Oval 74">
+            <a:extLst>
+              <a:ext uri="{FF2B5EF4-FFF2-40B4-BE49-F238E27FC236}">
+                <a16:creationId xmlns:a16="http://schemas.microsoft.com/office/drawing/2014/main" id="{68DD80F4-62BD-8880-0224-A475FE78822A}"/>
+              </a:ext>
+            </a:extLst>
+          </p:cNvPr>
+          <p:cNvSpPr/>
+          <p:nvPr/>
+        </p:nvSpPr>
+        <p:spPr>
+          <a:xfrm>
+            <a:off x="8640424" y="3270717"/>
+            <a:ext cx="167425" cy="167425"/>
+          </a:xfrm>
+          <a:prstGeom prst="ellipse">
+            <a:avLst/>
+          </a:prstGeom>
+          <a:pattFill prst="wdUpDiag">
+            <a:fgClr>
+              <a:srgbClr val="00B050"/>
+            </a:fgClr>
+            <a:bgClr>
+              <a:schemeClr val="bg1"/>
+            </a:bgClr>
+          </a:pattFill>
+        </p:spPr>
+        <p:style>
+          <a:lnRef idx="2">
+            <a:schemeClr val="accent1">
+              <a:shade val="50000"/>
+            </a:schemeClr>
+          </a:lnRef>
+          <a:fillRef idx="1">
+            <a:schemeClr val="accent1"/>
+          </a:fillRef>
+          <a:effectRef idx="0">
+            <a:schemeClr val="accent1"/>
+          </a:effectRef>
+          <a:fontRef idx="minor">
+            <a:schemeClr val="lt1"/>
+          </a:fontRef>
+        </p:style>
+        <p:txBody>
+          <a:bodyPr rtlCol="0" anchor="ctr"/>
+          <a:lstStyle/>
+          <a:p>
+            <a:pPr algn="ctr"/>
+            <a:endParaRPr lang="en-GB"/>
+          </a:p>
+        </p:txBody>
+      </p:sp>
+      <p:cxnSp>
+        <p:nvCxnSpPr>
+          <p:cNvPr id="76" name="Straight Connector 75">
+            <a:extLst>
+              <a:ext uri="{FF2B5EF4-FFF2-40B4-BE49-F238E27FC236}">
+                <a16:creationId xmlns:a16="http://schemas.microsoft.com/office/drawing/2014/main" id="{963906A9-A029-5451-5930-E54D99E4A29F}"/>
+              </a:ext>
+            </a:extLst>
+          </p:cNvPr>
+          <p:cNvCxnSpPr>
+            <a:cxnSpLocks/>
+            <a:stCxn id="74" idx="1"/>
+            <a:endCxn id="72" idx="5"/>
+          </p:cNvCxnSpPr>
+          <p:nvPr/>
+        </p:nvCxnSpPr>
+        <p:spPr>
+          <a:xfrm flipH="1" flipV="1">
+            <a:off x="8237114" y="3358872"/>
+            <a:ext cx="532847" cy="461625"/>
+          </a:xfrm>
+          <a:prstGeom prst="line">
+            <a:avLst/>
+          </a:prstGeom>
+          <a:ln w="12700"/>
+        </p:spPr>
+        <p:style>
+          <a:lnRef idx="1">
+            <a:schemeClr val="accent1"/>
+          </a:lnRef>
+          <a:fillRef idx="0">
+            <a:schemeClr val="accent1"/>
+          </a:fillRef>
+          <a:effectRef idx="0">
+            <a:schemeClr val="accent1"/>
+          </a:effectRef>
+          <a:fontRef idx="minor">
+            <a:schemeClr val="tx1"/>
+          </a:fontRef>
+        </p:style>
+      </p:cxnSp>
+      <p:cxnSp>
+        <p:nvCxnSpPr>
+          <p:cNvPr id="80" name="Straight Connector 79">
+            <a:extLst>
+              <a:ext uri="{FF2B5EF4-FFF2-40B4-BE49-F238E27FC236}">
+                <a16:creationId xmlns:a16="http://schemas.microsoft.com/office/drawing/2014/main" id="{DB0AE73B-D3B9-2E70-E734-69E7ADC29678}"/>
+              </a:ext>
+            </a:extLst>
+          </p:cNvPr>
+          <p:cNvCxnSpPr>
+            <a:cxnSpLocks/>
+            <a:stCxn id="74" idx="7"/>
+            <a:endCxn id="71" idx="3"/>
+          </p:cNvCxnSpPr>
+          <p:nvPr/>
+        </p:nvCxnSpPr>
+        <p:spPr>
+          <a:xfrm flipV="1">
+            <a:off x="8888348" y="3342796"/>
+            <a:ext cx="191329" cy="477701"/>
+          </a:xfrm>
+          <a:prstGeom prst="line">
+            <a:avLst/>
+          </a:prstGeom>
+          <a:ln w="12700"/>
+        </p:spPr>
+        <p:style>
+          <a:lnRef idx="1">
+            <a:schemeClr val="accent1"/>
+          </a:lnRef>
+          <a:fillRef idx="0">
+            <a:schemeClr val="accent1"/>
+          </a:fillRef>
+          <a:effectRef idx="0">
+            <a:schemeClr val="accent1"/>
+          </a:effectRef>
+          <a:fontRef idx="minor">
+            <a:schemeClr val="tx1"/>
+          </a:fontRef>
+        </p:style>
+      </p:cxnSp>
+      <p:cxnSp>
+        <p:nvCxnSpPr>
+          <p:cNvPr id="84" name="Straight Connector 83">
+            <a:extLst>
+              <a:ext uri="{FF2B5EF4-FFF2-40B4-BE49-F238E27FC236}">
+                <a16:creationId xmlns:a16="http://schemas.microsoft.com/office/drawing/2014/main" id="{532ED73C-C468-0DA8-F9D9-5740D6387DAB}"/>
+              </a:ext>
+            </a:extLst>
+          </p:cNvPr>
+          <p:cNvCxnSpPr>
+            <a:cxnSpLocks/>
+            <a:stCxn id="73" idx="7"/>
+            <a:endCxn id="75" idx="3"/>
+          </p:cNvCxnSpPr>
+          <p:nvPr/>
+        </p:nvCxnSpPr>
+        <p:spPr>
+          <a:xfrm flipV="1">
+            <a:off x="8213210" y="3413623"/>
+            <a:ext cx="451733" cy="431463"/>
+          </a:xfrm>
+          <a:prstGeom prst="line">
+            <a:avLst/>
+          </a:prstGeom>
+          <a:ln w="12700"/>
+        </p:spPr>
+        <p:style>
+          <a:lnRef idx="1">
+            <a:schemeClr val="accent1"/>
+          </a:lnRef>
+          <a:fillRef idx="0">
+            <a:schemeClr val="accent1"/>
+          </a:fillRef>
+          <a:effectRef idx="0">
+            <a:schemeClr val="accent1"/>
+          </a:effectRef>
+          <a:fontRef idx="minor">
+            <a:schemeClr val="tx1"/>
+          </a:fontRef>
+        </p:style>
+      </p:cxnSp>
+      <p:cxnSp>
+        <p:nvCxnSpPr>
+          <p:cNvPr id="89" name="Straight Connector 88">
+            <a:extLst>
+              <a:ext uri="{FF2B5EF4-FFF2-40B4-BE49-F238E27FC236}">
+                <a16:creationId xmlns:a16="http://schemas.microsoft.com/office/drawing/2014/main" id="{5C8E3A9D-D693-68BA-8156-A7622C87A629}"/>
+              </a:ext>
+            </a:extLst>
+          </p:cNvPr>
+          <p:cNvCxnSpPr>
+            <a:cxnSpLocks/>
+            <a:stCxn id="71" idx="1"/>
+            <a:endCxn id="70" idx="5"/>
+          </p:cNvCxnSpPr>
+          <p:nvPr/>
+        </p:nvCxnSpPr>
+        <p:spPr>
+          <a:xfrm flipH="1" flipV="1">
+            <a:off x="8726734" y="2939744"/>
+            <a:ext cx="352943" cy="284665"/>
+          </a:xfrm>
+          <a:prstGeom prst="line">
+            <a:avLst/>
+          </a:prstGeom>
+          <a:ln w="12700"/>
+        </p:spPr>
+        <p:style>
+          <a:lnRef idx="1">
+            <a:schemeClr val="accent1"/>
+          </a:lnRef>
+          <a:fillRef idx="0">
+            <a:schemeClr val="accent1"/>
+          </a:fillRef>
+          <a:effectRef idx="0">
+            <a:schemeClr val="accent1"/>
+          </a:effectRef>
+          <a:fontRef idx="minor">
+            <a:schemeClr val="tx1"/>
+          </a:fontRef>
+        </p:style>
+      </p:cxnSp>
+      <p:cxnSp>
+        <p:nvCxnSpPr>
+          <p:cNvPr id="92" name="Straight Connector 91">
+            <a:extLst>
+              <a:ext uri="{FF2B5EF4-FFF2-40B4-BE49-F238E27FC236}">
+                <a16:creationId xmlns:a16="http://schemas.microsoft.com/office/drawing/2014/main" id="{8740CBF6-777F-11C6-3BF5-BB2543D00D0E}"/>
+              </a:ext>
+            </a:extLst>
+          </p:cNvPr>
+          <p:cNvCxnSpPr>
+            <a:cxnSpLocks/>
+            <a:stCxn id="74" idx="0"/>
+            <a:endCxn id="75" idx="4"/>
+          </p:cNvCxnSpPr>
+          <p:nvPr/>
+        </p:nvCxnSpPr>
+        <p:spPr>
+          <a:xfrm flipH="1" flipV="1">
+            <a:off x="8724137" y="3438142"/>
+            <a:ext cx="105018" cy="357836"/>
+          </a:xfrm>
+          <a:prstGeom prst="line">
+            <a:avLst/>
+          </a:prstGeom>
+          <a:ln w="12700"/>
+        </p:spPr>
+        <p:style>
+          <a:lnRef idx="1">
+            <a:schemeClr val="accent1"/>
+          </a:lnRef>
+          <a:fillRef idx="0">
+            <a:schemeClr val="accent1"/>
+          </a:fillRef>
+          <a:effectRef idx="0">
+            <a:schemeClr val="accent1"/>
+          </a:effectRef>
+          <a:fontRef idx="minor">
+            <a:schemeClr val="tx1"/>
+          </a:fontRef>
+        </p:style>
+      </p:cxnSp>
+      <p:cxnSp>
+        <p:nvCxnSpPr>
+          <p:cNvPr id="100" name="Straight Connector 99">
+            <a:extLst>
+              <a:ext uri="{FF2B5EF4-FFF2-40B4-BE49-F238E27FC236}">
+                <a16:creationId xmlns:a16="http://schemas.microsoft.com/office/drawing/2014/main" id="{66C3C10A-15DD-CA08-3BEB-A2791B7AC850}"/>
+              </a:ext>
+            </a:extLst>
+          </p:cNvPr>
+          <p:cNvCxnSpPr>
+            <a:cxnSpLocks/>
+            <a:stCxn id="70" idx="3"/>
+            <a:endCxn id="72" idx="7"/>
+          </p:cNvCxnSpPr>
+          <p:nvPr/>
+        </p:nvCxnSpPr>
+        <p:spPr>
+          <a:xfrm flipH="1">
+            <a:off x="8237114" y="2939744"/>
+            <a:ext cx="371233" cy="300741"/>
+          </a:xfrm>
+          <a:prstGeom prst="line">
+            <a:avLst/>
+          </a:prstGeom>
+          <a:ln w="12700"/>
+        </p:spPr>
+        <p:style>
+          <a:lnRef idx="1">
+            <a:schemeClr val="accent1"/>
+          </a:lnRef>
+          <a:fillRef idx="0">
+            <a:schemeClr val="accent1"/>
+          </a:fillRef>
+          <a:effectRef idx="0">
+            <a:schemeClr val="accent1"/>
+          </a:effectRef>
+          <a:fontRef idx="minor">
+            <a:schemeClr val="tx1"/>
+          </a:fontRef>
+        </p:style>
+      </p:cxnSp>
+      <p:cxnSp>
+        <p:nvCxnSpPr>
+          <p:cNvPr id="106" name="Straight Connector 105">
+            <a:extLst>
+              <a:ext uri="{FF2B5EF4-FFF2-40B4-BE49-F238E27FC236}">
+                <a16:creationId xmlns:a16="http://schemas.microsoft.com/office/drawing/2014/main" id="{DAA3388B-A8D4-7950-D39D-FEE661C7AA26}"/>
+              </a:ext>
+            </a:extLst>
+          </p:cNvPr>
+          <p:cNvCxnSpPr>
+            <a:cxnSpLocks/>
+            <a:stCxn id="73" idx="0"/>
+            <a:endCxn id="72" idx="4"/>
+          </p:cNvCxnSpPr>
+          <p:nvPr/>
+        </p:nvCxnSpPr>
+        <p:spPr>
+          <a:xfrm flipV="1">
+            <a:off x="8154017" y="3383391"/>
+            <a:ext cx="23904" cy="437176"/>
+          </a:xfrm>
+          <a:prstGeom prst="line">
+            <a:avLst/>
+          </a:prstGeom>
+          <a:ln w="12700"/>
+        </p:spPr>
+        <p:style>
+          <a:lnRef idx="1">
+            <a:schemeClr val="accent1"/>
+          </a:lnRef>
+          <a:fillRef idx="0">
+            <a:schemeClr val="accent1"/>
+          </a:fillRef>
+          <a:effectRef idx="0">
+            <a:schemeClr val="accent1"/>
+          </a:effectRef>
+          <a:fontRef idx="minor">
+            <a:schemeClr val="tx1"/>
+          </a:fontRef>
+        </p:style>
+      </p:cxnSp>
+      <p:sp>
+        <p:nvSpPr>
+          <p:cNvPr id="109" name="TextBox 108">
+            <a:extLst>
+              <a:ext uri="{FF2B5EF4-FFF2-40B4-BE49-F238E27FC236}">
+                <a16:creationId xmlns:a16="http://schemas.microsoft.com/office/drawing/2014/main" id="{95E4F4F7-3191-2BB9-3E6F-65412CDD921D}"/>
+              </a:ext>
+            </a:extLst>
+          </p:cNvPr>
+          <p:cNvSpPr txBox="1"/>
+          <p:nvPr/>
+        </p:nvSpPr>
+        <p:spPr>
+          <a:xfrm>
+            <a:off x="7723108" y="2380961"/>
+            <a:ext cx="1770549" cy="338554"/>
+          </a:xfrm>
+          <a:prstGeom prst="rect">
+            <a:avLst/>
+          </a:prstGeom>
+          <a:noFill/>
+        </p:spPr>
+        <p:txBody>
+          <a:bodyPr wrap="none" rtlCol="0">
+            <a:spAutoFit/>
+          </a:bodyPr>
+          <a:lstStyle/>
+          <a:p>
+            <a:r>
+              <a:rPr lang="en-GB" sz="1600" i="1" dirty="0"/>
+              <a:t>App-2 sub-network</a:t>
+            </a:r>
+          </a:p>
+        </p:txBody>
+      </p:sp>
+      <p:sp>
+        <p:nvSpPr>
+          <p:cNvPr id="115" name="Oval 114">
+            <a:extLst>
+              <a:ext uri="{FF2B5EF4-FFF2-40B4-BE49-F238E27FC236}">
+                <a16:creationId xmlns:a16="http://schemas.microsoft.com/office/drawing/2014/main" id="{C3A5310C-33B7-DB57-89B2-48979FF5F7F9}"/>
+              </a:ext>
+            </a:extLst>
+          </p:cNvPr>
+          <p:cNvSpPr/>
+          <p:nvPr/>
+        </p:nvSpPr>
+        <p:spPr>
+          <a:xfrm>
+            <a:off x="9615718" y="3060181"/>
+            <a:ext cx="167425" cy="167425"/>
+          </a:xfrm>
+          <a:prstGeom prst="ellipse">
+            <a:avLst/>
+          </a:prstGeom>
+          <a:pattFill prst="smGrid">
+            <a:fgClr>
+              <a:srgbClr val="FF0000"/>
+            </a:fgClr>
+            <a:bgClr>
+              <a:schemeClr val="bg1"/>
+            </a:bgClr>
+          </a:pattFill>
+        </p:spPr>
+        <p:style>
+          <a:lnRef idx="2">
+            <a:schemeClr val="accent1">
+              <a:shade val="50000"/>
+            </a:schemeClr>
+          </a:lnRef>
+          <a:fillRef idx="1">
+            <a:schemeClr val="accent1"/>
+          </a:fillRef>
+          <a:effectRef idx="0">
+            <a:schemeClr val="accent1"/>
+          </a:effectRef>
+          <a:fontRef idx="minor">
+            <a:schemeClr val="lt1"/>
+          </a:fontRef>
+        </p:style>
+        <p:txBody>
+          <a:bodyPr rtlCol="0" anchor="ctr"/>
+          <a:lstStyle/>
+          <a:p>
+            <a:pPr algn="ctr"/>
+            <a:endParaRPr lang="en-GB" dirty="0"/>
+          </a:p>
+        </p:txBody>
+      </p:sp>
+      <p:sp>
+        <p:nvSpPr>
+          <p:cNvPr id="116" name="Oval 115">
+            <a:extLst>
+              <a:ext uri="{FF2B5EF4-FFF2-40B4-BE49-F238E27FC236}">
+                <a16:creationId xmlns:a16="http://schemas.microsoft.com/office/drawing/2014/main" id="{6DDAF3DE-763C-751C-92CA-38D1B443779B}"/>
+              </a:ext>
+            </a:extLst>
+          </p:cNvPr>
+          <p:cNvSpPr/>
+          <p:nvPr/>
+        </p:nvSpPr>
+        <p:spPr>
+          <a:xfrm>
+            <a:off x="10219510" y="3018269"/>
+            <a:ext cx="167425" cy="167425"/>
+          </a:xfrm>
+          <a:prstGeom prst="ellipse">
+            <a:avLst/>
+          </a:prstGeom>
+          <a:pattFill prst="smGrid">
+            <a:fgClr>
+              <a:srgbClr val="FF0000"/>
+            </a:fgClr>
+            <a:bgClr>
+              <a:schemeClr val="bg1"/>
+            </a:bgClr>
+          </a:pattFill>
+        </p:spPr>
+        <p:style>
+          <a:lnRef idx="2">
+            <a:schemeClr val="accent1">
+              <a:shade val="50000"/>
+            </a:schemeClr>
+          </a:lnRef>
+          <a:fillRef idx="1">
+            <a:schemeClr val="accent1"/>
+          </a:fillRef>
+          <a:effectRef idx="0">
+            <a:schemeClr val="accent1"/>
+          </a:effectRef>
+          <a:fontRef idx="minor">
+            <a:schemeClr val="lt1"/>
+          </a:fontRef>
+        </p:style>
+        <p:txBody>
+          <a:bodyPr rtlCol="0" anchor="ctr"/>
+          <a:lstStyle/>
+          <a:p>
+            <a:pPr algn="ctr"/>
+            <a:endParaRPr lang="en-GB"/>
+          </a:p>
+        </p:txBody>
+      </p:sp>
+      <p:sp>
+        <p:nvSpPr>
+          <p:cNvPr id="117" name="Oval 116">
+            <a:extLst>
+              <a:ext uri="{FF2B5EF4-FFF2-40B4-BE49-F238E27FC236}">
+                <a16:creationId xmlns:a16="http://schemas.microsoft.com/office/drawing/2014/main" id="{AC507E41-FE47-8961-7956-C6C727E8CDFA}"/>
+              </a:ext>
+            </a:extLst>
+          </p:cNvPr>
+          <p:cNvSpPr/>
+          <p:nvPr/>
+        </p:nvSpPr>
+        <p:spPr>
+          <a:xfrm>
+            <a:off x="10792001" y="2886296"/>
+            <a:ext cx="167425" cy="167425"/>
+          </a:xfrm>
+          <a:prstGeom prst="ellipse">
+            <a:avLst/>
+          </a:prstGeom>
+          <a:pattFill prst="smGrid">
+            <a:fgClr>
+              <a:srgbClr val="FF0000"/>
+            </a:fgClr>
+            <a:bgClr>
+              <a:schemeClr val="bg1"/>
+            </a:bgClr>
+          </a:pattFill>
+        </p:spPr>
+        <p:style>
+          <a:lnRef idx="2">
+            <a:schemeClr val="accent1">
+              <a:shade val="50000"/>
+            </a:schemeClr>
+          </a:lnRef>
+          <a:fillRef idx="1">
+            <a:schemeClr val="accent1"/>
+          </a:fillRef>
+          <a:effectRef idx="0">
+            <a:schemeClr val="accent1"/>
+          </a:effectRef>
+          <a:fontRef idx="minor">
+            <a:schemeClr val="lt1"/>
+          </a:fontRef>
+        </p:style>
+        <p:txBody>
+          <a:bodyPr rtlCol="0" anchor="ctr"/>
+          <a:lstStyle/>
+          <a:p>
+            <a:pPr algn="ctr"/>
+            <a:endParaRPr lang="en-GB"/>
+          </a:p>
+        </p:txBody>
+      </p:sp>
+      <p:sp>
+        <p:nvSpPr>
+          <p:cNvPr id="118" name="Oval 117">
+            <a:extLst>
+              <a:ext uri="{FF2B5EF4-FFF2-40B4-BE49-F238E27FC236}">
+                <a16:creationId xmlns:a16="http://schemas.microsoft.com/office/drawing/2014/main" id="{C2CC41F3-B264-0B8A-5E1A-24E320E88CB9}"/>
+              </a:ext>
+            </a:extLst>
+          </p:cNvPr>
+          <p:cNvSpPr/>
+          <p:nvPr/>
+        </p:nvSpPr>
+        <p:spPr>
+          <a:xfrm>
+            <a:off x="10231769" y="3870100"/>
+            <a:ext cx="167425" cy="167425"/>
+          </a:xfrm>
+          <a:prstGeom prst="ellipse">
+            <a:avLst/>
+          </a:prstGeom>
+          <a:pattFill prst="smGrid">
+            <a:fgClr>
+              <a:srgbClr val="FF0000"/>
+            </a:fgClr>
+            <a:bgClr>
+              <a:schemeClr val="bg1"/>
+            </a:bgClr>
+          </a:pattFill>
+        </p:spPr>
+        <p:style>
+          <a:lnRef idx="2">
+            <a:schemeClr val="accent1">
+              <a:shade val="50000"/>
+            </a:schemeClr>
+          </a:lnRef>
+          <a:fillRef idx="1">
+            <a:schemeClr val="accent1"/>
+          </a:fillRef>
+          <a:effectRef idx="0">
+            <a:schemeClr val="accent1"/>
+          </a:effectRef>
+          <a:fontRef idx="minor">
+            <a:schemeClr val="lt1"/>
+          </a:fontRef>
+        </p:style>
+        <p:txBody>
+          <a:bodyPr rtlCol="0" anchor="ctr"/>
+          <a:lstStyle/>
+          <a:p>
+            <a:pPr algn="ctr"/>
+            <a:endParaRPr lang="en-GB"/>
+          </a:p>
+        </p:txBody>
+      </p:sp>
+      <p:sp>
+        <p:nvSpPr>
+          <p:cNvPr id="119" name="Oval 118">
+            <a:extLst>
+              <a:ext uri="{FF2B5EF4-FFF2-40B4-BE49-F238E27FC236}">
+                <a16:creationId xmlns:a16="http://schemas.microsoft.com/office/drawing/2014/main" id="{D42694E2-0EA0-3EB7-6C84-F4E12144A5ED}"/>
+              </a:ext>
+            </a:extLst>
+          </p:cNvPr>
+          <p:cNvSpPr/>
+          <p:nvPr/>
+        </p:nvSpPr>
+        <p:spPr>
+          <a:xfrm>
+            <a:off x="10893542" y="3510237"/>
+            <a:ext cx="167425" cy="167425"/>
+          </a:xfrm>
+          <a:prstGeom prst="ellipse">
+            <a:avLst/>
+          </a:prstGeom>
+          <a:pattFill prst="smGrid">
+            <a:fgClr>
+              <a:srgbClr val="FF0000"/>
+            </a:fgClr>
+            <a:bgClr>
+              <a:schemeClr val="bg1"/>
+            </a:bgClr>
+          </a:pattFill>
+        </p:spPr>
+        <p:style>
+          <a:lnRef idx="2">
+            <a:schemeClr val="accent1">
+              <a:shade val="50000"/>
+            </a:schemeClr>
+          </a:lnRef>
+          <a:fillRef idx="1">
+            <a:schemeClr val="accent1"/>
+          </a:fillRef>
+          <a:effectRef idx="0">
+            <a:schemeClr val="accent1"/>
+          </a:effectRef>
+          <a:fontRef idx="minor">
+            <a:schemeClr val="lt1"/>
+          </a:fontRef>
+        </p:style>
+        <p:txBody>
+          <a:bodyPr rtlCol="0" anchor="ctr"/>
+          <a:lstStyle/>
+          <a:p>
+            <a:pPr algn="ctr"/>
+            <a:endParaRPr lang="en-GB"/>
+          </a:p>
+        </p:txBody>
+      </p:sp>
+      <p:cxnSp>
+        <p:nvCxnSpPr>
+          <p:cNvPr id="122" name="Straight Connector 121">
+            <a:extLst>
+              <a:ext uri="{FF2B5EF4-FFF2-40B4-BE49-F238E27FC236}">
+                <a16:creationId xmlns:a16="http://schemas.microsoft.com/office/drawing/2014/main" id="{6723B20E-FD99-272B-2D68-5B51DC0F9D4C}"/>
+              </a:ext>
+            </a:extLst>
+          </p:cNvPr>
+          <p:cNvCxnSpPr>
+            <a:cxnSpLocks/>
+            <a:stCxn id="118" idx="7"/>
+            <a:endCxn id="117" idx="4"/>
+          </p:cNvCxnSpPr>
+          <p:nvPr/>
+        </p:nvCxnSpPr>
+        <p:spPr>
+          <a:xfrm flipV="1">
+            <a:off x="10374675" y="3053721"/>
+            <a:ext cx="501039" cy="840898"/>
+          </a:xfrm>
+          <a:prstGeom prst="line">
+            <a:avLst/>
+          </a:prstGeom>
+          <a:ln w="12700"/>
+        </p:spPr>
+        <p:style>
+          <a:lnRef idx="1">
+            <a:schemeClr val="accent1"/>
+          </a:lnRef>
+          <a:fillRef idx="0">
+            <a:schemeClr val="accent1"/>
+          </a:fillRef>
+          <a:effectRef idx="0">
+            <a:schemeClr val="accent1"/>
+          </a:effectRef>
+          <a:fontRef idx="minor">
+            <a:schemeClr val="tx1"/>
+          </a:fontRef>
+        </p:style>
+      </p:cxnSp>
+      <p:cxnSp>
+        <p:nvCxnSpPr>
+          <p:cNvPr id="126" name="Straight Connector 125">
+            <a:extLst>
+              <a:ext uri="{FF2B5EF4-FFF2-40B4-BE49-F238E27FC236}">
+                <a16:creationId xmlns:a16="http://schemas.microsoft.com/office/drawing/2014/main" id="{5768E719-F435-9156-D08C-A93F14A27C65}"/>
+              </a:ext>
+            </a:extLst>
+          </p:cNvPr>
+          <p:cNvCxnSpPr>
+            <a:cxnSpLocks/>
+            <a:stCxn id="115" idx="6"/>
+            <a:endCxn id="116" idx="2"/>
+          </p:cNvCxnSpPr>
+          <p:nvPr/>
+        </p:nvCxnSpPr>
+        <p:spPr>
+          <a:xfrm flipV="1">
+            <a:off x="9783143" y="3101982"/>
+            <a:ext cx="436367" cy="41912"/>
+          </a:xfrm>
+          <a:prstGeom prst="line">
+            <a:avLst/>
+          </a:prstGeom>
+          <a:ln w="12700"/>
+        </p:spPr>
+        <p:style>
+          <a:lnRef idx="1">
+            <a:schemeClr val="accent1"/>
+          </a:lnRef>
+          <a:fillRef idx="0">
+            <a:schemeClr val="accent1"/>
+          </a:fillRef>
+          <a:effectRef idx="0">
+            <a:schemeClr val="accent1"/>
+          </a:effectRef>
+          <a:fontRef idx="minor">
+            <a:schemeClr val="tx1"/>
+          </a:fontRef>
+        </p:style>
+      </p:cxnSp>
+      <p:cxnSp>
+        <p:nvCxnSpPr>
+          <p:cNvPr id="129" name="Straight Connector 128">
+            <a:extLst>
+              <a:ext uri="{FF2B5EF4-FFF2-40B4-BE49-F238E27FC236}">
+                <a16:creationId xmlns:a16="http://schemas.microsoft.com/office/drawing/2014/main" id="{4284079C-C30D-223F-76AF-0D1E4246DAD8}"/>
+              </a:ext>
+            </a:extLst>
+          </p:cNvPr>
+          <p:cNvCxnSpPr>
+            <a:cxnSpLocks/>
+            <a:stCxn id="119" idx="3"/>
+          </p:cNvCxnSpPr>
+          <p:nvPr/>
+        </p:nvCxnSpPr>
+        <p:spPr>
+          <a:xfrm flipH="1">
+            <a:off x="10374675" y="3653143"/>
+            <a:ext cx="543386" cy="342581"/>
+          </a:xfrm>
+          <a:prstGeom prst="line">
+            <a:avLst/>
+          </a:prstGeom>
+          <a:ln w="12700"/>
+        </p:spPr>
+        <p:style>
+          <a:lnRef idx="1">
+            <a:schemeClr val="accent1"/>
+          </a:lnRef>
+          <a:fillRef idx="0">
+            <a:schemeClr val="accent1"/>
+          </a:fillRef>
+          <a:effectRef idx="0">
+            <a:schemeClr val="accent1"/>
+          </a:effectRef>
+          <a:fontRef idx="minor">
+            <a:schemeClr val="tx1"/>
+          </a:fontRef>
+        </p:style>
+      </p:cxnSp>
+      <p:cxnSp>
+        <p:nvCxnSpPr>
+          <p:cNvPr id="132" name="Straight Connector 131">
+            <a:extLst>
+              <a:ext uri="{FF2B5EF4-FFF2-40B4-BE49-F238E27FC236}">
+                <a16:creationId xmlns:a16="http://schemas.microsoft.com/office/drawing/2014/main" id="{42426DA9-DDBC-C099-C203-3AFC3BEDC16A}"/>
+              </a:ext>
+            </a:extLst>
+          </p:cNvPr>
+          <p:cNvCxnSpPr>
+            <a:cxnSpLocks/>
+            <a:stCxn id="115" idx="5"/>
+            <a:endCxn id="118" idx="2"/>
+          </p:cNvCxnSpPr>
+          <p:nvPr/>
+        </p:nvCxnSpPr>
+        <p:spPr>
+          <a:xfrm>
+            <a:off x="9758624" y="3203087"/>
+            <a:ext cx="473145" cy="750726"/>
+          </a:xfrm>
+          <a:prstGeom prst="line">
+            <a:avLst/>
+          </a:prstGeom>
+          <a:ln w="12700"/>
+        </p:spPr>
+        <p:style>
+          <a:lnRef idx="1">
+            <a:schemeClr val="accent1"/>
+          </a:lnRef>
+          <a:fillRef idx="0">
+            <a:schemeClr val="accent1"/>
+          </a:fillRef>
+          <a:effectRef idx="0">
+            <a:schemeClr val="accent1"/>
+          </a:effectRef>
+          <a:fontRef idx="minor">
+            <a:schemeClr val="tx1"/>
+          </a:fontRef>
+        </p:style>
+      </p:cxnSp>
+      <p:cxnSp>
+        <p:nvCxnSpPr>
+          <p:cNvPr id="136" name="Straight Connector 135">
+            <a:extLst>
+              <a:ext uri="{FF2B5EF4-FFF2-40B4-BE49-F238E27FC236}">
+                <a16:creationId xmlns:a16="http://schemas.microsoft.com/office/drawing/2014/main" id="{E7EBC8D6-474F-5869-1ABB-A7DA435A4B05}"/>
+              </a:ext>
+            </a:extLst>
+          </p:cNvPr>
+          <p:cNvCxnSpPr>
+            <a:cxnSpLocks/>
+            <a:stCxn id="119" idx="0"/>
+            <a:endCxn id="117" idx="5"/>
+          </p:cNvCxnSpPr>
+          <p:nvPr/>
+        </p:nvCxnSpPr>
+        <p:spPr>
+          <a:xfrm flipH="1" flipV="1">
+            <a:off x="10934907" y="3029202"/>
+            <a:ext cx="42348" cy="481035"/>
+          </a:xfrm>
+          <a:prstGeom prst="line">
+            <a:avLst/>
+          </a:prstGeom>
+          <a:ln w="12700"/>
+        </p:spPr>
+        <p:style>
+          <a:lnRef idx="1">
+            <a:schemeClr val="accent1"/>
+          </a:lnRef>
+          <a:fillRef idx="0">
+            <a:schemeClr val="accent1"/>
+          </a:fillRef>
+          <a:effectRef idx="0">
+            <a:schemeClr val="accent1"/>
+          </a:effectRef>
+          <a:fontRef idx="minor">
+            <a:schemeClr val="tx1"/>
+          </a:fontRef>
+        </p:style>
+      </p:cxnSp>
+      <p:cxnSp>
+        <p:nvCxnSpPr>
+          <p:cNvPr id="148" name="Straight Connector 147">
+            <a:extLst>
+              <a:ext uri="{FF2B5EF4-FFF2-40B4-BE49-F238E27FC236}">
+                <a16:creationId xmlns:a16="http://schemas.microsoft.com/office/drawing/2014/main" id="{3314D38B-17CE-6E10-499B-6E189EB48A61}"/>
+              </a:ext>
+            </a:extLst>
+          </p:cNvPr>
+          <p:cNvCxnSpPr>
+            <a:cxnSpLocks/>
+            <a:stCxn id="119" idx="1"/>
+            <a:endCxn id="116" idx="6"/>
+          </p:cNvCxnSpPr>
+          <p:nvPr/>
+        </p:nvCxnSpPr>
+        <p:spPr>
+          <a:xfrm flipH="1" flipV="1">
+            <a:off x="10386935" y="3101982"/>
+            <a:ext cx="531126" cy="432774"/>
+          </a:xfrm>
+          <a:prstGeom prst="line">
+            <a:avLst/>
+          </a:prstGeom>
+          <a:ln w="12700"/>
+        </p:spPr>
+        <p:style>
+          <a:lnRef idx="1">
+            <a:schemeClr val="accent1"/>
+          </a:lnRef>
+          <a:fillRef idx="0">
+            <a:schemeClr val="accent1"/>
+          </a:fillRef>
+          <a:effectRef idx="0">
+            <a:schemeClr val="accent1"/>
+          </a:effectRef>
+          <a:fontRef idx="minor">
+            <a:schemeClr val="tx1"/>
+          </a:fontRef>
+        </p:style>
+      </p:cxnSp>
+      <p:cxnSp>
+        <p:nvCxnSpPr>
+          <p:cNvPr id="153" name="Straight Connector 152">
+            <a:extLst>
+              <a:ext uri="{FF2B5EF4-FFF2-40B4-BE49-F238E27FC236}">
+                <a16:creationId xmlns:a16="http://schemas.microsoft.com/office/drawing/2014/main" id="{E5AFFFB1-0A28-38A7-BC7A-A1DDA3B73480}"/>
+              </a:ext>
+            </a:extLst>
+          </p:cNvPr>
+          <p:cNvCxnSpPr>
+            <a:cxnSpLocks/>
+            <a:stCxn id="115" idx="5"/>
+            <a:endCxn id="119" idx="2"/>
+          </p:cNvCxnSpPr>
+          <p:nvPr/>
+        </p:nvCxnSpPr>
+        <p:spPr>
+          <a:xfrm>
+            <a:off x="9758624" y="3203087"/>
+            <a:ext cx="1134918" cy="390863"/>
+          </a:xfrm>
+          <a:prstGeom prst="line">
+            <a:avLst/>
+          </a:prstGeom>
+          <a:ln w="12700"/>
+        </p:spPr>
+        <p:style>
+          <a:lnRef idx="1">
+            <a:schemeClr val="accent1"/>
+          </a:lnRef>
+          <a:fillRef idx="0">
+            <a:schemeClr val="accent1"/>
+          </a:fillRef>
+          <a:effectRef idx="0">
+            <a:schemeClr val="accent1"/>
+          </a:effectRef>
+          <a:fontRef idx="minor">
+            <a:schemeClr val="tx1"/>
+          </a:fontRef>
+        </p:style>
+      </p:cxnSp>
+      <p:sp>
+        <p:nvSpPr>
+          <p:cNvPr id="157" name="TextBox 156">
+            <a:extLst>
+              <a:ext uri="{FF2B5EF4-FFF2-40B4-BE49-F238E27FC236}">
+                <a16:creationId xmlns:a16="http://schemas.microsoft.com/office/drawing/2014/main" id="{75523CDC-70B2-29A0-0AA6-CA05E2B156A9}"/>
+              </a:ext>
+            </a:extLst>
+          </p:cNvPr>
+          <p:cNvSpPr txBox="1"/>
+          <p:nvPr/>
+        </p:nvSpPr>
+        <p:spPr>
+          <a:xfrm>
+            <a:off x="9477496" y="2388679"/>
+            <a:ext cx="1770549" cy="338554"/>
+          </a:xfrm>
+          <a:prstGeom prst="rect">
+            <a:avLst/>
+          </a:prstGeom>
+          <a:noFill/>
+        </p:spPr>
+        <p:txBody>
+          <a:bodyPr wrap="none" rtlCol="0">
+            <a:spAutoFit/>
+          </a:bodyPr>
+          <a:lstStyle/>
+          <a:p>
+            <a:r>
+              <a:rPr lang="en-GB" sz="1600" i="1" dirty="0"/>
+              <a:t>App-3 sub-network</a:t>
+            </a:r>
+          </a:p>
+        </p:txBody>
+      </p:sp>
+      <p:sp>
+        <p:nvSpPr>
+          <p:cNvPr id="158" name="Oval 157">
+            <a:extLst>
+              <a:ext uri="{FF2B5EF4-FFF2-40B4-BE49-F238E27FC236}">
+                <a16:creationId xmlns:a16="http://schemas.microsoft.com/office/drawing/2014/main" id="{7178F742-8CD8-E18F-D3CF-6728D6A8ACA4}"/>
+              </a:ext>
+            </a:extLst>
+          </p:cNvPr>
+          <p:cNvSpPr/>
+          <p:nvPr/>
+        </p:nvSpPr>
+        <p:spPr>
+          <a:xfrm>
+            <a:off x="6125438" y="2095959"/>
+            <a:ext cx="167425" cy="167425"/>
+          </a:xfrm>
+          <a:prstGeom prst="ellipse">
+            <a:avLst/>
+          </a:prstGeom>
+          <a:solidFill>
+            <a:schemeClr val="tx1"/>
+          </a:solidFill>
+        </p:spPr>
+        <p:style>
+          <a:lnRef idx="2">
+            <a:schemeClr val="accent1">
+              <a:shade val="50000"/>
+            </a:schemeClr>
+          </a:lnRef>
+          <a:fillRef idx="1">
+            <a:schemeClr val="accent1"/>
+          </a:fillRef>
+          <a:effectRef idx="0">
+            <a:schemeClr val="accent1"/>
+          </a:effectRef>
+          <a:fontRef idx="minor">
+            <a:schemeClr val="lt1"/>
+          </a:fontRef>
+        </p:style>
+        <p:txBody>
+          <a:bodyPr rtlCol="0" anchor="ctr"/>
+          <a:lstStyle/>
+          <a:p>
+            <a:pPr algn="ctr"/>
+            <a:endParaRPr lang="en-GB"/>
+          </a:p>
+        </p:txBody>
+      </p:sp>
+      <p:sp>
+        <p:nvSpPr>
+          <p:cNvPr id="159" name="TextBox 158">
+            <a:extLst>
+              <a:ext uri="{FF2B5EF4-FFF2-40B4-BE49-F238E27FC236}">
+                <a16:creationId xmlns:a16="http://schemas.microsoft.com/office/drawing/2014/main" id="{3185B08B-D863-D258-1A46-4B2772DFEF20}"/>
+              </a:ext>
+            </a:extLst>
+          </p:cNvPr>
+          <p:cNvSpPr txBox="1"/>
+          <p:nvPr/>
+        </p:nvSpPr>
+        <p:spPr>
+          <a:xfrm>
+            <a:off x="6288889" y="2006012"/>
+            <a:ext cx="1192634" cy="338554"/>
+          </a:xfrm>
+          <a:prstGeom prst="rect">
+            <a:avLst/>
+          </a:prstGeom>
+          <a:noFill/>
+        </p:spPr>
+        <p:txBody>
+          <a:bodyPr wrap="none" rtlCol="0">
+            <a:spAutoFit/>
+          </a:bodyPr>
+          <a:lstStyle/>
+          <a:p>
+            <a:r>
+              <a:rPr lang="en-GB" sz="1600" dirty="0"/>
+              <a:t>App-1 peers</a:t>
+            </a:r>
+          </a:p>
+        </p:txBody>
+      </p:sp>
+      <p:sp>
+        <p:nvSpPr>
+          <p:cNvPr id="161" name="TextBox 160">
+            <a:extLst>
+              <a:ext uri="{FF2B5EF4-FFF2-40B4-BE49-F238E27FC236}">
+                <a16:creationId xmlns:a16="http://schemas.microsoft.com/office/drawing/2014/main" id="{F6772C8D-A62A-5973-D459-CC0C25D1801F}"/>
+              </a:ext>
+            </a:extLst>
+          </p:cNvPr>
+          <p:cNvSpPr txBox="1"/>
+          <p:nvPr/>
+        </p:nvSpPr>
+        <p:spPr>
+          <a:xfrm>
+            <a:off x="8229374" y="1997951"/>
+            <a:ext cx="1192634" cy="338554"/>
+          </a:xfrm>
+          <a:prstGeom prst="rect">
+            <a:avLst/>
+          </a:prstGeom>
+          <a:noFill/>
+        </p:spPr>
+        <p:txBody>
+          <a:bodyPr wrap="none" rtlCol="0">
+            <a:spAutoFit/>
+          </a:bodyPr>
+          <a:lstStyle/>
+          <a:p>
+            <a:r>
+              <a:rPr lang="en-GB" sz="1600" dirty="0"/>
+              <a:t>App-2 peers</a:t>
+            </a:r>
+          </a:p>
+        </p:txBody>
+      </p:sp>
+      <p:sp>
+        <p:nvSpPr>
+          <p:cNvPr id="162" name="Oval 161">
+            <a:extLst>
+              <a:ext uri="{FF2B5EF4-FFF2-40B4-BE49-F238E27FC236}">
+                <a16:creationId xmlns:a16="http://schemas.microsoft.com/office/drawing/2014/main" id="{B9A41E6A-3FD1-3474-BC32-33453A3E60E6}"/>
+              </a:ext>
+            </a:extLst>
+          </p:cNvPr>
+          <p:cNvSpPr/>
+          <p:nvPr/>
+        </p:nvSpPr>
+        <p:spPr>
+          <a:xfrm>
+            <a:off x="9908650" y="2097193"/>
+            <a:ext cx="167425" cy="167425"/>
+          </a:xfrm>
+          <a:prstGeom prst="ellipse">
+            <a:avLst/>
+          </a:prstGeom>
+          <a:pattFill prst="smGrid">
+            <a:fgClr>
+              <a:srgbClr val="FF0000"/>
+            </a:fgClr>
+            <a:bgClr>
+              <a:schemeClr val="bg1"/>
+            </a:bgClr>
+          </a:pattFill>
+        </p:spPr>
+        <p:style>
+          <a:lnRef idx="2">
+            <a:schemeClr val="accent1">
+              <a:shade val="50000"/>
+            </a:schemeClr>
+          </a:lnRef>
+          <a:fillRef idx="1">
+            <a:schemeClr val="accent1"/>
+          </a:fillRef>
+          <a:effectRef idx="0">
+            <a:schemeClr val="accent1"/>
+          </a:effectRef>
+          <a:fontRef idx="minor">
+            <a:schemeClr val="lt1"/>
+          </a:fontRef>
+        </p:style>
+        <p:txBody>
+          <a:bodyPr rtlCol="0" anchor="ctr"/>
+          <a:lstStyle/>
+          <a:p>
+            <a:pPr algn="ctr"/>
+            <a:endParaRPr lang="en-GB"/>
+          </a:p>
+        </p:txBody>
+      </p:sp>
+      <p:sp>
+        <p:nvSpPr>
+          <p:cNvPr id="163" name="Oval 162">
+            <a:extLst>
+              <a:ext uri="{FF2B5EF4-FFF2-40B4-BE49-F238E27FC236}">
+                <a16:creationId xmlns:a16="http://schemas.microsoft.com/office/drawing/2014/main" id="{8B018A8A-E44D-6B45-26B8-C9F7151EA6C2}"/>
+              </a:ext>
+            </a:extLst>
+          </p:cNvPr>
+          <p:cNvSpPr/>
+          <p:nvPr/>
+        </p:nvSpPr>
+        <p:spPr>
+          <a:xfrm>
+            <a:off x="8064424" y="2103817"/>
+            <a:ext cx="167425" cy="167425"/>
+          </a:xfrm>
+          <a:prstGeom prst="ellipse">
+            <a:avLst/>
+          </a:prstGeom>
+          <a:pattFill prst="wdUpDiag">
+            <a:fgClr>
+              <a:srgbClr val="00B050"/>
+            </a:fgClr>
+            <a:bgClr>
+              <a:schemeClr val="bg1"/>
+            </a:bgClr>
+          </a:pattFill>
+        </p:spPr>
+        <p:style>
+          <a:lnRef idx="2">
+            <a:schemeClr val="accent1">
+              <a:shade val="50000"/>
+            </a:schemeClr>
+          </a:lnRef>
+          <a:fillRef idx="1">
+            <a:schemeClr val="accent1"/>
+          </a:fillRef>
+          <a:effectRef idx="0">
+            <a:schemeClr val="accent1"/>
+          </a:effectRef>
+          <a:fontRef idx="minor">
+            <a:schemeClr val="lt1"/>
+          </a:fontRef>
+        </p:style>
+        <p:txBody>
+          <a:bodyPr rtlCol="0" anchor="ctr"/>
+          <a:lstStyle/>
+          <a:p>
+            <a:pPr algn="ctr"/>
+            <a:endParaRPr lang="en-GB"/>
+          </a:p>
+        </p:txBody>
+      </p:sp>
+      <p:sp>
+        <p:nvSpPr>
+          <p:cNvPr id="164" name="TextBox 163">
+            <a:extLst>
+              <a:ext uri="{FF2B5EF4-FFF2-40B4-BE49-F238E27FC236}">
+                <a16:creationId xmlns:a16="http://schemas.microsoft.com/office/drawing/2014/main" id="{8AC067FC-4F17-3DA6-7B3F-26D1E7714AAC}"/>
+              </a:ext>
+            </a:extLst>
+          </p:cNvPr>
+          <p:cNvSpPr txBox="1"/>
+          <p:nvPr/>
+        </p:nvSpPr>
+        <p:spPr>
+          <a:xfrm>
+            <a:off x="10050051" y="1998164"/>
+            <a:ext cx="1192634" cy="338554"/>
+          </a:xfrm>
+          <a:prstGeom prst="rect">
+            <a:avLst/>
+          </a:prstGeom>
+          <a:noFill/>
+        </p:spPr>
+        <p:txBody>
+          <a:bodyPr wrap="none" rtlCol="0">
+            <a:spAutoFit/>
+          </a:bodyPr>
+          <a:lstStyle/>
+          <a:p>
+            <a:r>
+              <a:rPr lang="en-GB" sz="1600" dirty="0"/>
+              <a:t>App-3 peers</a:t>
+            </a:r>
+          </a:p>
+        </p:txBody>
+      </p:sp>
+      <p:sp>
+        <p:nvSpPr>
+          <p:cNvPr id="165" name="Rectangle 164">
+            <a:extLst>
+              <a:ext uri="{FF2B5EF4-FFF2-40B4-BE49-F238E27FC236}">
+                <a16:creationId xmlns:a16="http://schemas.microsoft.com/office/drawing/2014/main" id="{E381E640-23ED-E6FA-0216-7D2D86E99FF1}"/>
+              </a:ext>
+            </a:extLst>
+          </p:cNvPr>
+          <p:cNvSpPr/>
+          <p:nvPr/>
+        </p:nvSpPr>
+        <p:spPr>
+          <a:xfrm>
+            <a:off x="6008263" y="1984178"/>
+            <a:ext cx="5195788" cy="379390"/>
+          </a:xfrm>
+          <a:prstGeom prst="rect">
+            <a:avLst/>
+          </a:prstGeom>
+          <a:noFill/>
+          <a:ln>
             <a:solidFill>
               <a:schemeClr val="tx1"/>
             </a:solidFill>
-          </p:spPr>
-          <p:style>
-            <a:lnRef idx="2">
-              <a:schemeClr val="accent1">
-                <a:shade val="50000"/>
-              </a:schemeClr>
-            </a:lnRef>
-            <a:fillRef idx="1">
-              <a:schemeClr val="accent1"/>
-            </a:fillRef>
-            <a:effectRef idx="0">
-              <a:schemeClr val="accent1"/>
-            </a:effectRef>
-            <a:fontRef idx="minor">
-              <a:schemeClr val="lt1"/>
-            </a:fontRef>
-          </p:style>
-          <p:txBody>
-            <a:bodyPr rtlCol="0" anchor="ctr"/>
-            <a:lstStyle/>
-            <a:p>
-              <a:pPr algn="ctr"/>
-              <a:endParaRPr lang="en-GB"/>
-            </a:p>
-          </p:txBody>
-        </p:sp>
-        <p:sp>
-          <p:nvSpPr>
-            <p:cNvPr id="24" name="Oval 23">
-              <a:extLst>
-                <a:ext uri="{FF2B5EF4-FFF2-40B4-BE49-F238E27FC236}">
-                  <a16:creationId xmlns:a16="http://schemas.microsoft.com/office/drawing/2014/main" id="{18E16A3B-DEED-3CAD-AFAF-CE99257461D8}"/>
-                </a:ext>
-              </a:extLst>
-            </p:cNvPr>
-            <p:cNvSpPr/>
-            <p:nvPr/>
-          </p:nvSpPr>
-          <p:spPr>
-            <a:xfrm>
-              <a:off x="4593122" y="2997549"/>
-              <a:ext cx="167425" cy="167425"/>
-            </a:xfrm>
-            <a:prstGeom prst="ellipse">
-              <a:avLst/>
-            </a:prstGeom>
-            <a:solidFill>
-              <a:schemeClr val="tx1"/>
-            </a:solidFill>
-          </p:spPr>
-          <p:style>
-            <a:lnRef idx="2">
-              <a:schemeClr val="accent1">
-                <a:shade val="50000"/>
-              </a:schemeClr>
-            </a:lnRef>
-            <a:fillRef idx="1">
-              <a:schemeClr val="accent1"/>
-            </a:fillRef>
-            <a:effectRef idx="0">
-              <a:schemeClr val="accent1"/>
-            </a:effectRef>
-            <a:fontRef idx="minor">
-              <a:schemeClr val="lt1"/>
-            </a:fontRef>
-          </p:style>
-          <p:txBody>
-            <a:bodyPr rtlCol="0" anchor="ctr"/>
-            <a:lstStyle/>
-            <a:p>
-              <a:pPr algn="ctr"/>
-              <a:endParaRPr lang="en-GB"/>
-            </a:p>
-          </p:txBody>
-        </p:sp>
-        <p:sp>
-          <p:nvSpPr>
-            <p:cNvPr id="25" name="Oval 24">
-              <a:extLst>
-                <a:ext uri="{FF2B5EF4-FFF2-40B4-BE49-F238E27FC236}">
-                  <a16:creationId xmlns:a16="http://schemas.microsoft.com/office/drawing/2014/main" id="{06803BDE-6EA7-AC85-A6F6-A62D8D313386}"/>
-                </a:ext>
-              </a:extLst>
-            </p:cNvPr>
-            <p:cNvSpPr/>
-            <p:nvPr/>
-          </p:nvSpPr>
-          <p:spPr>
-            <a:xfrm>
-              <a:off x="3880493" y="3331675"/>
-              <a:ext cx="167425" cy="167425"/>
-            </a:xfrm>
-            <a:prstGeom prst="ellipse">
-              <a:avLst/>
-            </a:prstGeom>
-            <a:solidFill>
-              <a:schemeClr val="tx1"/>
-            </a:solidFill>
-          </p:spPr>
-          <p:style>
-            <a:lnRef idx="2">
-              <a:schemeClr val="accent1">
-                <a:shade val="50000"/>
-              </a:schemeClr>
-            </a:lnRef>
-            <a:fillRef idx="1">
-              <a:schemeClr val="accent1"/>
-            </a:fillRef>
-            <a:effectRef idx="0">
-              <a:schemeClr val="accent1"/>
-            </a:effectRef>
-            <a:fontRef idx="minor">
-              <a:schemeClr val="lt1"/>
-            </a:fontRef>
-          </p:style>
-          <p:txBody>
-            <a:bodyPr rtlCol="0" anchor="ctr"/>
-            <a:lstStyle/>
-            <a:p>
-              <a:pPr algn="ctr"/>
-              <a:endParaRPr lang="en-GB"/>
-            </a:p>
-          </p:txBody>
-        </p:sp>
-        <p:sp>
-          <p:nvSpPr>
-            <p:cNvPr id="26" name="Oval 25">
-              <a:extLst>
-                <a:ext uri="{FF2B5EF4-FFF2-40B4-BE49-F238E27FC236}">
-                  <a16:creationId xmlns:a16="http://schemas.microsoft.com/office/drawing/2014/main" id="{B3760D86-B7C8-BE31-2695-E4B8251C52D9}"/>
-                </a:ext>
-              </a:extLst>
-            </p:cNvPr>
-            <p:cNvSpPr/>
-            <p:nvPr/>
-          </p:nvSpPr>
-          <p:spPr>
-            <a:xfrm>
-              <a:off x="4249066" y="3712839"/>
-              <a:ext cx="167425" cy="167425"/>
-            </a:xfrm>
-            <a:prstGeom prst="ellipse">
-              <a:avLst/>
-            </a:prstGeom>
-            <a:solidFill>
-              <a:schemeClr val="tx1"/>
-            </a:solidFill>
-          </p:spPr>
-          <p:style>
-            <a:lnRef idx="2">
-              <a:schemeClr val="accent1">
-                <a:shade val="50000"/>
-              </a:schemeClr>
-            </a:lnRef>
-            <a:fillRef idx="1">
-              <a:schemeClr val="accent1"/>
-            </a:fillRef>
-            <a:effectRef idx="0">
-              <a:schemeClr val="accent1"/>
-            </a:effectRef>
-            <a:fontRef idx="minor">
-              <a:schemeClr val="lt1"/>
-            </a:fontRef>
-          </p:style>
-          <p:txBody>
-            <a:bodyPr rtlCol="0" anchor="ctr"/>
-            <a:lstStyle/>
-            <a:p>
-              <a:pPr algn="ctr"/>
-              <a:endParaRPr lang="en-GB"/>
-            </a:p>
-          </p:txBody>
-        </p:sp>
-        <p:sp>
-          <p:nvSpPr>
-            <p:cNvPr id="27" name="Oval 26">
-              <a:extLst>
-                <a:ext uri="{FF2B5EF4-FFF2-40B4-BE49-F238E27FC236}">
-                  <a16:creationId xmlns:a16="http://schemas.microsoft.com/office/drawing/2014/main" id="{4C857D8E-CF1D-4F89-C2C7-36F2A2C5D70F}"/>
-                </a:ext>
-              </a:extLst>
-            </p:cNvPr>
-            <p:cNvSpPr/>
-            <p:nvPr/>
-          </p:nvSpPr>
-          <p:spPr>
-            <a:xfrm>
-              <a:off x="3481705" y="2913836"/>
-              <a:ext cx="167425" cy="167425"/>
-            </a:xfrm>
-            <a:prstGeom prst="ellipse">
-              <a:avLst/>
-            </a:prstGeom>
-            <a:solidFill>
-              <a:schemeClr val="tx1"/>
-            </a:solidFill>
-          </p:spPr>
-          <p:style>
-            <a:lnRef idx="2">
-              <a:schemeClr val="accent1">
-                <a:shade val="50000"/>
-              </a:schemeClr>
-            </a:lnRef>
-            <a:fillRef idx="1">
-              <a:schemeClr val="accent1"/>
-            </a:fillRef>
-            <a:effectRef idx="0">
-              <a:schemeClr val="accent1"/>
-            </a:effectRef>
-            <a:fontRef idx="minor">
-              <a:schemeClr val="lt1"/>
-            </a:fontRef>
-          </p:style>
-          <p:txBody>
-            <a:bodyPr rtlCol="0" anchor="ctr"/>
-            <a:lstStyle/>
-            <a:p>
-              <a:pPr algn="ctr"/>
-              <a:endParaRPr lang="en-GB"/>
-            </a:p>
-          </p:txBody>
-        </p:sp>
-        <p:cxnSp>
-          <p:nvCxnSpPr>
-            <p:cNvPr id="29" name="Straight Connector 28">
-              <a:extLst>
-                <a:ext uri="{FF2B5EF4-FFF2-40B4-BE49-F238E27FC236}">
-                  <a16:creationId xmlns:a16="http://schemas.microsoft.com/office/drawing/2014/main" id="{3E414B73-A764-AE94-EB7F-43E50A1896A0}"/>
-                </a:ext>
-              </a:extLst>
-            </p:cNvPr>
-            <p:cNvCxnSpPr>
-              <a:cxnSpLocks/>
-              <a:stCxn id="27" idx="5"/>
-              <a:endCxn id="25" idx="1"/>
-            </p:cNvCxnSpPr>
-            <p:nvPr/>
-          </p:nvCxnSpPr>
-          <p:spPr>
-            <a:xfrm>
-              <a:off x="3624611" y="3056742"/>
-              <a:ext cx="280401" cy="299452"/>
-            </a:xfrm>
-            <a:prstGeom prst="line">
-              <a:avLst/>
-            </a:prstGeom>
-            <a:ln w="12700"/>
-          </p:spPr>
-          <p:style>
-            <a:lnRef idx="1">
-              <a:schemeClr val="accent1"/>
-            </a:lnRef>
-            <a:fillRef idx="0">
-              <a:schemeClr val="accent1"/>
-            </a:fillRef>
-            <a:effectRef idx="0">
-              <a:schemeClr val="accent1"/>
-            </a:effectRef>
-            <a:fontRef idx="minor">
-              <a:schemeClr val="tx1"/>
-            </a:fontRef>
-          </p:style>
-        </p:cxnSp>
-        <p:cxnSp>
-          <p:nvCxnSpPr>
-            <p:cNvPr id="33" name="Straight Connector 32">
-              <a:extLst>
-                <a:ext uri="{FF2B5EF4-FFF2-40B4-BE49-F238E27FC236}">
-                  <a16:creationId xmlns:a16="http://schemas.microsoft.com/office/drawing/2014/main" id="{F414F055-3E79-C09D-22D9-F94BFA76AD2C}"/>
-                </a:ext>
-              </a:extLst>
-            </p:cNvPr>
-            <p:cNvCxnSpPr>
-              <a:cxnSpLocks/>
-              <a:stCxn id="24" idx="1"/>
-              <a:endCxn id="23" idx="5"/>
-            </p:cNvCxnSpPr>
-            <p:nvPr/>
-          </p:nvCxnSpPr>
-          <p:spPr>
-            <a:xfrm flipH="1" flipV="1">
-              <a:off x="4391971" y="2729946"/>
-              <a:ext cx="225670" cy="292122"/>
-            </a:xfrm>
-            <a:prstGeom prst="line">
-              <a:avLst/>
-            </a:prstGeom>
-            <a:ln w="12700"/>
-          </p:spPr>
-          <p:style>
-            <a:lnRef idx="1">
-              <a:schemeClr val="accent1"/>
-            </a:lnRef>
-            <a:fillRef idx="0">
-              <a:schemeClr val="accent1"/>
-            </a:fillRef>
-            <a:effectRef idx="0">
-              <a:schemeClr val="accent1"/>
-            </a:effectRef>
-            <a:fontRef idx="minor">
-              <a:schemeClr val="tx1"/>
-            </a:fontRef>
-          </p:style>
-        </p:cxnSp>
-        <p:cxnSp>
-          <p:nvCxnSpPr>
-            <p:cNvPr id="37" name="Straight Connector 36">
-              <a:extLst>
-                <a:ext uri="{FF2B5EF4-FFF2-40B4-BE49-F238E27FC236}">
-                  <a16:creationId xmlns:a16="http://schemas.microsoft.com/office/drawing/2014/main" id="{AECD52E1-F626-7286-051F-36DA72F14A48}"/>
-                </a:ext>
-              </a:extLst>
-            </p:cNvPr>
-            <p:cNvCxnSpPr>
-              <a:cxnSpLocks/>
-              <a:stCxn id="26" idx="1"/>
-              <a:endCxn id="25" idx="5"/>
-            </p:cNvCxnSpPr>
-            <p:nvPr/>
-          </p:nvCxnSpPr>
-          <p:spPr>
-            <a:xfrm flipH="1" flipV="1">
-              <a:off x="4023399" y="3474581"/>
-              <a:ext cx="250186" cy="262777"/>
-            </a:xfrm>
-            <a:prstGeom prst="line">
-              <a:avLst/>
-            </a:prstGeom>
-            <a:ln w="12700"/>
-          </p:spPr>
-          <p:style>
-            <a:lnRef idx="1">
-              <a:schemeClr val="accent1"/>
-            </a:lnRef>
-            <a:fillRef idx="0">
-              <a:schemeClr val="accent1"/>
-            </a:fillRef>
-            <a:effectRef idx="0">
-              <a:schemeClr val="accent1"/>
-            </a:effectRef>
-            <a:fontRef idx="minor">
-              <a:schemeClr val="tx1"/>
-            </a:fontRef>
-          </p:style>
-        </p:cxnSp>
-        <p:cxnSp>
-          <p:nvCxnSpPr>
-            <p:cNvPr id="39" name="Straight Connector 38">
-              <a:extLst>
-                <a:ext uri="{FF2B5EF4-FFF2-40B4-BE49-F238E27FC236}">
-                  <a16:creationId xmlns:a16="http://schemas.microsoft.com/office/drawing/2014/main" id="{F6A9B73D-87CD-DC7A-1006-C081A7862114}"/>
-                </a:ext>
-              </a:extLst>
-            </p:cNvPr>
-            <p:cNvCxnSpPr>
-              <a:cxnSpLocks/>
-              <a:stCxn id="25" idx="6"/>
-              <a:endCxn id="24" idx="3"/>
-            </p:cNvCxnSpPr>
-            <p:nvPr/>
-          </p:nvCxnSpPr>
-          <p:spPr>
-            <a:xfrm flipV="1">
-              <a:off x="4047918" y="3140455"/>
-              <a:ext cx="569723" cy="274933"/>
-            </a:xfrm>
-            <a:prstGeom prst="line">
-              <a:avLst/>
-            </a:prstGeom>
-            <a:ln w="12700"/>
-          </p:spPr>
-          <p:style>
-            <a:lnRef idx="1">
-              <a:schemeClr val="accent1"/>
-            </a:lnRef>
-            <a:fillRef idx="0">
-              <a:schemeClr val="accent1"/>
-            </a:fillRef>
-            <a:effectRef idx="0">
-              <a:schemeClr val="accent1"/>
-            </a:effectRef>
-            <a:fontRef idx="minor">
-              <a:schemeClr val="tx1"/>
-            </a:fontRef>
-          </p:style>
-        </p:cxnSp>
-        <p:cxnSp>
-          <p:nvCxnSpPr>
-            <p:cNvPr id="63" name="Straight Connector 62">
-              <a:extLst>
-                <a:ext uri="{FF2B5EF4-FFF2-40B4-BE49-F238E27FC236}">
-                  <a16:creationId xmlns:a16="http://schemas.microsoft.com/office/drawing/2014/main" id="{C73326AE-2E5E-E2DD-E7EB-E8A419BEE957}"/>
-                </a:ext>
-              </a:extLst>
-            </p:cNvPr>
-            <p:cNvCxnSpPr>
-              <a:cxnSpLocks/>
-              <a:stCxn id="26" idx="7"/>
-              <a:endCxn id="23" idx="4"/>
-            </p:cNvCxnSpPr>
-            <p:nvPr/>
-          </p:nvCxnSpPr>
-          <p:spPr>
-            <a:xfrm flipH="1" flipV="1">
-              <a:off x="4332778" y="2754465"/>
-              <a:ext cx="59194" cy="982893"/>
-            </a:xfrm>
-            <a:prstGeom prst="line">
-              <a:avLst/>
-            </a:prstGeom>
-            <a:ln w="12700"/>
-          </p:spPr>
-          <p:style>
-            <a:lnRef idx="1">
-              <a:schemeClr val="accent1"/>
-            </a:lnRef>
-            <a:fillRef idx="0">
-              <a:schemeClr val="accent1"/>
-            </a:fillRef>
-            <a:effectRef idx="0">
-              <a:schemeClr val="accent1"/>
-            </a:effectRef>
-            <a:fontRef idx="minor">
-              <a:schemeClr val="tx1"/>
-            </a:fontRef>
-          </p:style>
-        </p:cxnSp>
-        <p:cxnSp>
-          <p:nvCxnSpPr>
-            <p:cNvPr id="66" name="Straight Connector 65">
-              <a:extLst>
-                <a:ext uri="{FF2B5EF4-FFF2-40B4-BE49-F238E27FC236}">
-                  <a16:creationId xmlns:a16="http://schemas.microsoft.com/office/drawing/2014/main" id="{681FEC13-CF79-BA67-E2C2-179737F0D63C}"/>
-                </a:ext>
-              </a:extLst>
-            </p:cNvPr>
-            <p:cNvCxnSpPr>
-              <a:cxnSpLocks/>
-              <a:stCxn id="27" idx="7"/>
-              <a:endCxn id="24" idx="2"/>
-            </p:cNvCxnSpPr>
-            <p:nvPr/>
-          </p:nvCxnSpPr>
-          <p:spPr>
-            <a:xfrm>
-              <a:off x="3624611" y="2938355"/>
-              <a:ext cx="968511" cy="142907"/>
-            </a:xfrm>
-            <a:prstGeom prst="line">
-              <a:avLst/>
-            </a:prstGeom>
-            <a:ln w="12700"/>
-          </p:spPr>
-          <p:style>
-            <a:lnRef idx="1">
-              <a:schemeClr val="accent1"/>
-            </a:lnRef>
-            <a:fillRef idx="0">
-              <a:schemeClr val="accent1"/>
-            </a:fillRef>
-            <a:effectRef idx="0">
-              <a:schemeClr val="accent1"/>
-            </a:effectRef>
-            <a:fontRef idx="minor">
-              <a:schemeClr val="tx1"/>
-            </a:fontRef>
-          </p:style>
-        </p:cxnSp>
-        <p:sp>
-          <p:nvSpPr>
-            <p:cNvPr id="69" name="TextBox 68">
-              <a:extLst>
-                <a:ext uri="{FF2B5EF4-FFF2-40B4-BE49-F238E27FC236}">
-                  <a16:creationId xmlns:a16="http://schemas.microsoft.com/office/drawing/2014/main" id="{D96C88DB-C047-C4CD-D1A3-D9630F51EBD5}"/>
-                </a:ext>
-              </a:extLst>
-            </p:cNvPr>
-            <p:cNvSpPr txBox="1"/>
-            <p:nvPr/>
-          </p:nvSpPr>
-          <p:spPr>
-            <a:xfrm>
-              <a:off x="3209250" y="2225547"/>
-              <a:ext cx="1587871" cy="307777"/>
-            </a:xfrm>
-            <a:prstGeom prst="rect">
-              <a:avLst/>
-            </a:prstGeom>
-            <a:noFill/>
-          </p:spPr>
-          <p:txBody>
-            <a:bodyPr wrap="none" rtlCol="0">
-              <a:spAutoFit/>
-            </a:bodyPr>
-            <a:lstStyle/>
-            <a:p>
-              <a:r>
-                <a:rPr lang="en-GB" sz="1400" i="1" dirty="0"/>
-                <a:t>App-1 sub-network</a:t>
-              </a:r>
-            </a:p>
-          </p:txBody>
-        </p:sp>
-        <p:sp>
-          <p:nvSpPr>
-            <p:cNvPr id="70" name="Oval 69">
-              <a:extLst>
-                <a:ext uri="{FF2B5EF4-FFF2-40B4-BE49-F238E27FC236}">
-                  <a16:creationId xmlns:a16="http://schemas.microsoft.com/office/drawing/2014/main" id="{4019D79F-7E38-6FDE-949D-C4103EF0A13C}"/>
-                </a:ext>
-              </a:extLst>
-            </p:cNvPr>
-            <p:cNvSpPr/>
-            <p:nvPr/>
-          </p:nvSpPr>
-          <p:spPr>
-            <a:xfrm>
-              <a:off x="5497398" y="2629916"/>
-              <a:ext cx="167425" cy="167425"/>
-            </a:xfrm>
-            <a:prstGeom prst="ellipse">
-              <a:avLst/>
-            </a:prstGeom>
-            <a:pattFill prst="wdUpDiag">
-              <a:fgClr>
-                <a:srgbClr val="00B050"/>
-              </a:fgClr>
-              <a:bgClr>
-                <a:schemeClr val="bg1"/>
-              </a:bgClr>
-            </a:pattFill>
-          </p:spPr>
-          <p:style>
-            <a:lnRef idx="2">
-              <a:schemeClr val="accent1">
-                <a:shade val="50000"/>
-              </a:schemeClr>
-            </a:lnRef>
-            <a:fillRef idx="1">
-              <a:schemeClr val="accent1"/>
-            </a:fillRef>
-            <a:effectRef idx="0">
-              <a:schemeClr val="accent1"/>
-            </a:effectRef>
-            <a:fontRef idx="minor">
-              <a:schemeClr val="lt1"/>
-            </a:fontRef>
-          </p:style>
-          <p:txBody>
-            <a:bodyPr rtlCol="0" anchor="ctr"/>
-            <a:lstStyle/>
-            <a:p>
-              <a:pPr algn="ctr"/>
-              <a:endParaRPr lang="en-GB"/>
-            </a:p>
-          </p:txBody>
-        </p:sp>
-        <p:sp>
-          <p:nvSpPr>
-            <p:cNvPr id="71" name="Oval 70">
-              <a:extLst>
-                <a:ext uri="{FF2B5EF4-FFF2-40B4-BE49-F238E27FC236}">
-                  <a16:creationId xmlns:a16="http://schemas.microsoft.com/office/drawing/2014/main" id="{49CECF9E-916C-7687-55A3-3C447364DE7E}"/>
-                </a:ext>
-              </a:extLst>
-            </p:cNvPr>
-            <p:cNvSpPr/>
-            <p:nvPr/>
-          </p:nvSpPr>
-          <p:spPr>
-            <a:xfrm>
-              <a:off x="5968728" y="3032968"/>
-              <a:ext cx="167425" cy="167425"/>
-            </a:xfrm>
-            <a:prstGeom prst="ellipse">
-              <a:avLst/>
-            </a:prstGeom>
-            <a:pattFill prst="wdUpDiag">
-              <a:fgClr>
-                <a:srgbClr val="00B050"/>
-              </a:fgClr>
-              <a:bgClr>
-                <a:schemeClr val="bg1"/>
-              </a:bgClr>
-            </a:pattFill>
-          </p:spPr>
-          <p:style>
-            <a:lnRef idx="2">
-              <a:schemeClr val="accent1">
-                <a:shade val="50000"/>
-              </a:schemeClr>
-            </a:lnRef>
-            <a:fillRef idx="1">
-              <a:schemeClr val="accent1"/>
-            </a:fillRef>
-            <a:effectRef idx="0">
-              <a:schemeClr val="accent1"/>
-            </a:effectRef>
-            <a:fontRef idx="minor">
-              <a:schemeClr val="lt1"/>
-            </a:fontRef>
-          </p:style>
-          <p:txBody>
-            <a:bodyPr rtlCol="0" anchor="ctr"/>
-            <a:lstStyle/>
-            <a:p>
-              <a:pPr algn="ctr"/>
-              <a:endParaRPr lang="en-GB"/>
-            </a:p>
-          </p:txBody>
-        </p:sp>
-        <p:sp>
-          <p:nvSpPr>
-            <p:cNvPr id="72" name="Oval 71">
-              <a:extLst>
-                <a:ext uri="{FF2B5EF4-FFF2-40B4-BE49-F238E27FC236}">
-                  <a16:creationId xmlns:a16="http://schemas.microsoft.com/office/drawing/2014/main" id="{2A85C9B8-FA8B-1776-5DB2-4A810B805AE8}"/>
-                </a:ext>
-              </a:extLst>
-            </p:cNvPr>
-            <p:cNvSpPr/>
-            <p:nvPr/>
-          </p:nvSpPr>
-          <p:spPr>
-            <a:xfrm>
-              <a:off x="5007778" y="3049044"/>
-              <a:ext cx="167425" cy="167425"/>
-            </a:xfrm>
-            <a:prstGeom prst="ellipse">
-              <a:avLst/>
-            </a:prstGeom>
-            <a:pattFill prst="wdUpDiag">
-              <a:fgClr>
-                <a:srgbClr val="00B050"/>
-              </a:fgClr>
-              <a:bgClr>
-                <a:schemeClr val="bg1"/>
-              </a:bgClr>
-            </a:pattFill>
-          </p:spPr>
-          <p:style>
-            <a:lnRef idx="2">
-              <a:schemeClr val="accent1">
-                <a:shade val="50000"/>
-              </a:schemeClr>
-            </a:lnRef>
-            <a:fillRef idx="1">
-              <a:schemeClr val="accent1"/>
-            </a:fillRef>
-            <a:effectRef idx="0">
-              <a:schemeClr val="accent1"/>
-            </a:effectRef>
-            <a:fontRef idx="minor">
-              <a:schemeClr val="lt1"/>
-            </a:fontRef>
-          </p:style>
-          <p:txBody>
-            <a:bodyPr rtlCol="0" anchor="ctr"/>
-            <a:lstStyle/>
-            <a:p>
-              <a:pPr algn="ctr"/>
-              <a:endParaRPr lang="en-GB"/>
-            </a:p>
-          </p:txBody>
-        </p:sp>
-        <p:sp>
-          <p:nvSpPr>
-            <p:cNvPr id="73" name="Oval 72">
-              <a:extLst>
-                <a:ext uri="{FF2B5EF4-FFF2-40B4-BE49-F238E27FC236}">
-                  <a16:creationId xmlns:a16="http://schemas.microsoft.com/office/drawing/2014/main" id="{722A0B82-5E22-6816-6476-8BE83CCD6EB5}"/>
-                </a:ext>
-              </a:extLst>
-            </p:cNvPr>
-            <p:cNvSpPr/>
-            <p:nvPr/>
-          </p:nvSpPr>
-          <p:spPr>
-            <a:xfrm>
-              <a:off x="4983874" y="3653645"/>
-              <a:ext cx="167425" cy="167425"/>
-            </a:xfrm>
-            <a:prstGeom prst="ellipse">
-              <a:avLst/>
-            </a:prstGeom>
-            <a:pattFill prst="wdUpDiag">
-              <a:fgClr>
-                <a:srgbClr val="00B050"/>
-              </a:fgClr>
-              <a:bgClr>
-                <a:schemeClr val="bg1"/>
-              </a:bgClr>
-            </a:pattFill>
-          </p:spPr>
-          <p:style>
-            <a:lnRef idx="2">
-              <a:schemeClr val="accent1">
-                <a:shade val="50000"/>
-              </a:schemeClr>
-            </a:lnRef>
-            <a:fillRef idx="1">
-              <a:schemeClr val="accent1"/>
-            </a:fillRef>
-            <a:effectRef idx="0">
-              <a:schemeClr val="accent1"/>
-            </a:effectRef>
-            <a:fontRef idx="minor">
-              <a:schemeClr val="lt1"/>
-            </a:fontRef>
-          </p:style>
-          <p:txBody>
-            <a:bodyPr rtlCol="0" anchor="ctr"/>
-            <a:lstStyle/>
-            <a:p>
-              <a:pPr algn="ctr"/>
-              <a:endParaRPr lang="en-GB"/>
-            </a:p>
-          </p:txBody>
-        </p:sp>
-        <p:sp>
-          <p:nvSpPr>
-            <p:cNvPr id="74" name="Oval 73">
-              <a:extLst>
-                <a:ext uri="{FF2B5EF4-FFF2-40B4-BE49-F238E27FC236}">
-                  <a16:creationId xmlns:a16="http://schemas.microsoft.com/office/drawing/2014/main" id="{A050D133-A625-12EF-5D45-90B32726439A}"/>
-                </a:ext>
-              </a:extLst>
-            </p:cNvPr>
-            <p:cNvSpPr/>
-            <p:nvPr/>
-          </p:nvSpPr>
-          <p:spPr>
-            <a:xfrm>
-              <a:off x="5659012" y="3629056"/>
-              <a:ext cx="167425" cy="167425"/>
-            </a:xfrm>
-            <a:prstGeom prst="ellipse">
-              <a:avLst/>
-            </a:prstGeom>
-            <a:pattFill prst="wdUpDiag">
-              <a:fgClr>
-                <a:srgbClr val="00B050"/>
-              </a:fgClr>
-              <a:bgClr>
-                <a:schemeClr val="bg1"/>
-              </a:bgClr>
-            </a:pattFill>
-          </p:spPr>
-          <p:style>
-            <a:lnRef idx="2">
-              <a:schemeClr val="accent1">
-                <a:shade val="50000"/>
-              </a:schemeClr>
-            </a:lnRef>
-            <a:fillRef idx="1">
-              <a:schemeClr val="accent1"/>
-            </a:fillRef>
-            <a:effectRef idx="0">
-              <a:schemeClr val="accent1"/>
-            </a:effectRef>
-            <a:fontRef idx="minor">
-              <a:schemeClr val="lt1"/>
-            </a:fontRef>
-          </p:style>
-          <p:txBody>
-            <a:bodyPr rtlCol="0" anchor="ctr"/>
-            <a:lstStyle/>
-            <a:p>
-              <a:pPr algn="ctr"/>
-              <a:endParaRPr lang="en-GB"/>
-            </a:p>
-          </p:txBody>
-        </p:sp>
-        <p:sp>
-          <p:nvSpPr>
-            <p:cNvPr id="75" name="Oval 74">
-              <a:extLst>
-                <a:ext uri="{FF2B5EF4-FFF2-40B4-BE49-F238E27FC236}">
-                  <a16:creationId xmlns:a16="http://schemas.microsoft.com/office/drawing/2014/main" id="{68DD80F4-62BD-8880-0224-A475FE78822A}"/>
-                </a:ext>
-              </a:extLst>
-            </p:cNvPr>
-            <p:cNvSpPr/>
-            <p:nvPr/>
-          </p:nvSpPr>
-          <p:spPr>
-            <a:xfrm>
-              <a:off x="5553994" y="3103795"/>
-              <a:ext cx="167425" cy="167425"/>
-            </a:xfrm>
-            <a:prstGeom prst="ellipse">
-              <a:avLst/>
-            </a:prstGeom>
-            <a:pattFill prst="wdUpDiag">
-              <a:fgClr>
-                <a:srgbClr val="00B050"/>
-              </a:fgClr>
-              <a:bgClr>
-                <a:schemeClr val="bg1"/>
-              </a:bgClr>
-            </a:pattFill>
-          </p:spPr>
-          <p:style>
-            <a:lnRef idx="2">
-              <a:schemeClr val="accent1">
-                <a:shade val="50000"/>
-              </a:schemeClr>
-            </a:lnRef>
-            <a:fillRef idx="1">
-              <a:schemeClr val="accent1"/>
-            </a:fillRef>
-            <a:effectRef idx="0">
-              <a:schemeClr val="accent1"/>
-            </a:effectRef>
-            <a:fontRef idx="minor">
-              <a:schemeClr val="lt1"/>
-            </a:fontRef>
-          </p:style>
-          <p:txBody>
-            <a:bodyPr rtlCol="0" anchor="ctr"/>
-            <a:lstStyle/>
-            <a:p>
-              <a:pPr algn="ctr"/>
-              <a:endParaRPr lang="en-GB"/>
-            </a:p>
-          </p:txBody>
-        </p:sp>
-        <p:cxnSp>
-          <p:nvCxnSpPr>
-            <p:cNvPr id="76" name="Straight Connector 75">
-              <a:extLst>
-                <a:ext uri="{FF2B5EF4-FFF2-40B4-BE49-F238E27FC236}">
-                  <a16:creationId xmlns:a16="http://schemas.microsoft.com/office/drawing/2014/main" id="{963906A9-A029-5451-5930-E54D99E4A29F}"/>
-                </a:ext>
-              </a:extLst>
-            </p:cNvPr>
-            <p:cNvCxnSpPr>
-              <a:cxnSpLocks/>
-              <a:stCxn id="74" idx="1"/>
-              <a:endCxn id="72" idx="5"/>
-            </p:cNvCxnSpPr>
-            <p:nvPr/>
-          </p:nvCxnSpPr>
-          <p:spPr>
-            <a:xfrm flipH="1" flipV="1">
-              <a:off x="5150684" y="3191950"/>
-              <a:ext cx="532847" cy="461625"/>
-            </a:xfrm>
-            <a:prstGeom prst="line">
-              <a:avLst/>
-            </a:prstGeom>
-            <a:ln w="12700"/>
-          </p:spPr>
-          <p:style>
-            <a:lnRef idx="1">
-              <a:schemeClr val="accent1"/>
-            </a:lnRef>
-            <a:fillRef idx="0">
-              <a:schemeClr val="accent1"/>
-            </a:fillRef>
-            <a:effectRef idx="0">
-              <a:schemeClr val="accent1"/>
-            </a:effectRef>
-            <a:fontRef idx="minor">
-              <a:schemeClr val="tx1"/>
-            </a:fontRef>
-          </p:style>
-        </p:cxnSp>
-        <p:cxnSp>
-          <p:nvCxnSpPr>
-            <p:cNvPr id="80" name="Straight Connector 79">
-              <a:extLst>
-                <a:ext uri="{FF2B5EF4-FFF2-40B4-BE49-F238E27FC236}">
-                  <a16:creationId xmlns:a16="http://schemas.microsoft.com/office/drawing/2014/main" id="{DB0AE73B-D3B9-2E70-E734-69E7ADC29678}"/>
-                </a:ext>
-              </a:extLst>
-            </p:cNvPr>
-            <p:cNvCxnSpPr>
-              <a:cxnSpLocks/>
-              <a:stCxn id="74" idx="7"/>
-              <a:endCxn id="71" idx="3"/>
-            </p:cNvCxnSpPr>
-            <p:nvPr/>
-          </p:nvCxnSpPr>
-          <p:spPr>
-            <a:xfrm flipV="1">
-              <a:off x="5801918" y="3175874"/>
-              <a:ext cx="191329" cy="477701"/>
-            </a:xfrm>
-            <a:prstGeom prst="line">
-              <a:avLst/>
-            </a:prstGeom>
-            <a:ln w="12700"/>
-          </p:spPr>
-          <p:style>
-            <a:lnRef idx="1">
-              <a:schemeClr val="accent1"/>
-            </a:lnRef>
-            <a:fillRef idx="0">
-              <a:schemeClr val="accent1"/>
-            </a:fillRef>
-            <a:effectRef idx="0">
-              <a:schemeClr val="accent1"/>
-            </a:effectRef>
-            <a:fontRef idx="minor">
-              <a:schemeClr val="tx1"/>
-            </a:fontRef>
-          </p:style>
-        </p:cxnSp>
-        <p:cxnSp>
-          <p:nvCxnSpPr>
-            <p:cNvPr id="84" name="Straight Connector 83">
-              <a:extLst>
-                <a:ext uri="{FF2B5EF4-FFF2-40B4-BE49-F238E27FC236}">
-                  <a16:creationId xmlns:a16="http://schemas.microsoft.com/office/drawing/2014/main" id="{532ED73C-C468-0DA8-F9D9-5740D6387DAB}"/>
-                </a:ext>
-              </a:extLst>
-            </p:cNvPr>
-            <p:cNvCxnSpPr>
-              <a:cxnSpLocks/>
-              <a:stCxn id="73" idx="7"/>
-              <a:endCxn id="75" idx="3"/>
-            </p:cNvCxnSpPr>
-            <p:nvPr/>
-          </p:nvCxnSpPr>
-          <p:spPr>
-            <a:xfrm flipV="1">
-              <a:off x="5126780" y="3246701"/>
-              <a:ext cx="451733" cy="431463"/>
-            </a:xfrm>
-            <a:prstGeom prst="line">
-              <a:avLst/>
-            </a:prstGeom>
-            <a:ln w="12700"/>
-          </p:spPr>
-          <p:style>
-            <a:lnRef idx="1">
-              <a:schemeClr val="accent1"/>
-            </a:lnRef>
-            <a:fillRef idx="0">
-              <a:schemeClr val="accent1"/>
-            </a:fillRef>
-            <a:effectRef idx="0">
-              <a:schemeClr val="accent1"/>
-            </a:effectRef>
-            <a:fontRef idx="minor">
-              <a:schemeClr val="tx1"/>
-            </a:fontRef>
-          </p:style>
-        </p:cxnSp>
-        <p:cxnSp>
-          <p:nvCxnSpPr>
-            <p:cNvPr id="89" name="Straight Connector 88">
-              <a:extLst>
-                <a:ext uri="{FF2B5EF4-FFF2-40B4-BE49-F238E27FC236}">
-                  <a16:creationId xmlns:a16="http://schemas.microsoft.com/office/drawing/2014/main" id="{5C8E3A9D-D693-68BA-8156-A7622C87A629}"/>
-                </a:ext>
-              </a:extLst>
-            </p:cNvPr>
-            <p:cNvCxnSpPr>
-              <a:cxnSpLocks/>
-              <a:stCxn id="71" idx="1"/>
-              <a:endCxn id="70" idx="5"/>
-            </p:cNvCxnSpPr>
-            <p:nvPr/>
-          </p:nvCxnSpPr>
-          <p:spPr>
-            <a:xfrm flipH="1" flipV="1">
-              <a:off x="5640304" y="2772822"/>
-              <a:ext cx="352943" cy="284665"/>
-            </a:xfrm>
-            <a:prstGeom prst="line">
-              <a:avLst/>
-            </a:prstGeom>
-            <a:ln w="12700"/>
-          </p:spPr>
-          <p:style>
-            <a:lnRef idx="1">
-              <a:schemeClr val="accent1"/>
-            </a:lnRef>
-            <a:fillRef idx="0">
-              <a:schemeClr val="accent1"/>
-            </a:fillRef>
-            <a:effectRef idx="0">
-              <a:schemeClr val="accent1"/>
-            </a:effectRef>
-            <a:fontRef idx="minor">
-              <a:schemeClr val="tx1"/>
-            </a:fontRef>
-          </p:style>
-        </p:cxnSp>
-        <p:cxnSp>
-          <p:nvCxnSpPr>
-            <p:cNvPr id="92" name="Straight Connector 91">
-              <a:extLst>
-                <a:ext uri="{FF2B5EF4-FFF2-40B4-BE49-F238E27FC236}">
-                  <a16:creationId xmlns:a16="http://schemas.microsoft.com/office/drawing/2014/main" id="{8740CBF6-777F-11C6-3BF5-BB2543D00D0E}"/>
-                </a:ext>
-              </a:extLst>
-            </p:cNvPr>
-            <p:cNvCxnSpPr>
-              <a:cxnSpLocks/>
-              <a:stCxn id="74" idx="0"/>
-              <a:endCxn id="75" idx="4"/>
-            </p:cNvCxnSpPr>
-            <p:nvPr/>
-          </p:nvCxnSpPr>
-          <p:spPr>
-            <a:xfrm flipH="1" flipV="1">
-              <a:off x="5637707" y="3271220"/>
-              <a:ext cx="105018" cy="357836"/>
-            </a:xfrm>
-            <a:prstGeom prst="line">
-              <a:avLst/>
-            </a:prstGeom>
-            <a:ln w="12700"/>
-          </p:spPr>
-          <p:style>
-            <a:lnRef idx="1">
-              <a:schemeClr val="accent1"/>
-            </a:lnRef>
-            <a:fillRef idx="0">
-              <a:schemeClr val="accent1"/>
-            </a:fillRef>
-            <a:effectRef idx="0">
-              <a:schemeClr val="accent1"/>
-            </a:effectRef>
-            <a:fontRef idx="minor">
-              <a:schemeClr val="tx1"/>
-            </a:fontRef>
-          </p:style>
-        </p:cxnSp>
-        <p:cxnSp>
-          <p:nvCxnSpPr>
-            <p:cNvPr id="100" name="Straight Connector 99">
-              <a:extLst>
-                <a:ext uri="{FF2B5EF4-FFF2-40B4-BE49-F238E27FC236}">
-                  <a16:creationId xmlns:a16="http://schemas.microsoft.com/office/drawing/2014/main" id="{66C3C10A-15DD-CA08-3BEB-A2791B7AC850}"/>
-                </a:ext>
-              </a:extLst>
-            </p:cNvPr>
-            <p:cNvCxnSpPr>
-              <a:cxnSpLocks/>
-              <a:stCxn id="70" idx="3"/>
-              <a:endCxn id="72" idx="7"/>
-            </p:cNvCxnSpPr>
-            <p:nvPr/>
-          </p:nvCxnSpPr>
-          <p:spPr>
-            <a:xfrm flipH="1">
-              <a:off x="5150684" y="2772822"/>
-              <a:ext cx="371233" cy="300741"/>
-            </a:xfrm>
-            <a:prstGeom prst="line">
-              <a:avLst/>
-            </a:prstGeom>
-            <a:ln w="12700"/>
-          </p:spPr>
-          <p:style>
-            <a:lnRef idx="1">
-              <a:schemeClr val="accent1"/>
-            </a:lnRef>
-            <a:fillRef idx="0">
-              <a:schemeClr val="accent1"/>
-            </a:fillRef>
-            <a:effectRef idx="0">
-              <a:schemeClr val="accent1"/>
-            </a:effectRef>
-            <a:fontRef idx="minor">
-              <a:schemeClr val="tx1"/>
-            </a:fontRef>
-          </p:style>
-        </p:cxnSp>
-        <p:cxnSp>
-          <p:nvCxnSpPr>
-            <p:cNvPr id="106" name="Straight Connector 105">
-              <a:extLst>
-                <a:ext uri="{FF2B5EF4-FFF2-40B4-BE49-F238E27FC236}">
-                  <a16:creationId xmlns:a16="http://schemas.microsoft.com/office/drawing/2014/main" id="{DAA3388B-A8D4-7950-D39D-FEE661C7AA26}"/>
-                </a:ext>
-              </a:extLst>
-            </p:cNvPr>
-            <p:cNvCxnSpPr>
-              <a:cxnSpLocks/>
-              <a:stCxn id="73" idx="0"/>
-              <a:endCxn id="72" idx="4"/>
-            </p:cNvCxnSpPr>
-            <p:nvPr/>
-          </p:nvCxnSpPr>
-          <p:spPr>
-            <a:xfrm flipV="1">
-              <a:off x="5067587" y="3216469"/>
-              <a:ext cx="23904" cy="437176"/>
-            </a:xfrm>
-            <a:prstGeom prst="line">
-              <a:avLst/>
-            </a:prstGeom>
-            <a:ln w="12700"/>
-          </p:spPr>
-          <p:style>
-            <a:lnRef idx="1">
-              <a:schemeClr val="accent1"/>
-            </a:lnRef>
-            <a:fillRef idx="0">
-              <a:schemeClr val="accent1"/>
-            </a:fillRef>
-            <a:effectRef idx="0">
-              <a:schemeClr val="accent1"/>
-            </a:effectRef>
-            <a:fontRef idx="minor">
-              <a:schemeClr val="tx1"/>
-            </a:fontRef>
-          </p:style>
-        </p:cxnSp>
-        <p:sp>
-          <p:nvSpPr>
-            <p:cNvPr id="109" name="TextBox 108">
-              <a:extLst>
-                <a:ext uri="{FF2B5EF4-FFF2-40B4-BE49-F238E27FC236}">
-                  <a16:creationId xmlns:a16="http://schemas.microsoft.com/office/drawing/2014/main" id="{95E4F4F7-3191-2BB9-3E6F-65412CDD921D}"/>
-                </a:ext>
-              </a:extLst>
-            </p:cNvPr>
-            <p:cNvSpPr txBox="1"/>
-            <p:nvPr/>
-          </p:nvSpPr>
-          <p:spPr>
-            <a:xfrm>
-              <a:off x="4784577" y="2236578"/>
-              <a:ext cx="1587871" cy="307777"/>
-            </a:xfrm>
-            <a:prstGeom prst="rect">
-              <a:avLst/>
-            </a:prstGeom>
-            <a:noFill/>
-          </p:spPr>
-          <p:txBody>
-            <a:bodyPr wrap="none" rtlCol="0">
-              <a:spAutoFit/>
-            </a:bodyPr>
-            <a:lstStyle/>
-            <a:p>
-              <a:r>
-                <a:rPr lang="en-GB" sz="1400" i="1" dirty="0"/>
-                <a:t>App-2 sub-network</a:t>
-              </a:r>
-            </a:p>
-          </p:txBody>
-        </p:sp>
-        <p:sp>
-          <p:nvSpPr>
-            <p:cNvPr id="115" name="Oval 114">
-              <a:extLst>
-                <a:ext uri="{FF2B5EF4-FFF2-40B4-BE49-F238E27FC236}">
-                  <a16:creationId xmlns:a16="http://schemas.microsoft.com/office/drawing/2014/main" id="{C3A5310C-33B7-DB57-89B2-48979FF5F7F9}"/>
-                </a:ext>
-              </a:extLst>
-            </p:cNvPr>
-            <p:cNvSpPr/>
-            <p:nvPr/>
-          </p:nvSpPr>
-          <p:spPr>
-            <a:xfrm>
-              <a:off x="6440080" y="2893259"/>
-              <a:ext cx="167425" cy="167425"/>
-            </a:xfrm>
-            <a:prstGeom prst="ellipse">
-              <a:avLst/>
-            </a:prstGeom>
-            <a:pattFill prst="smGrid">
-              <a:fgClr>
-                <a:srgbClr val="FF0000"/>
-              </a:fgClr>
-              <a:bgClr>
-                <a:schemeClr val="bg1"/>
-              </a:bgClr>
-            </a:pattFill>
-          </p:spPr>
-          <p:style>
-            <a:lnRef idx="2">
-              <a:schemeClr val="accent1">
-                <a:shade val="50000"/>
-              </a:schemeClr>
-            </a:lnRef>
-            <a:fillRef idx="1">
-              <a:schemeClr val="accent1"/>
-            </a:fillRef>
-            <a:effectRef idx="0">
-              <a:schemeClr val="accent1"/>
-            </a:effectRef>
-            <a:fontRef idx="minor">
-              <a:schemeClr val="lt1"/>
-            </a:fontRef>
-          </p:style>
-          <p:txBody>
-            <a:bodyPr rtlCol="0" anchor="ctr"/>
-            <a:lstStyle/>
-            <a:p>
-              <a:pPr algn="ctr"/>
-              <a:endParaRPr lang="en-GB" dirty="0"/>
-            </a:p>
-          </p:txBody>
-        </p:sp>
-        <p:sp>
-          <p:nvSpPr>
-            <p:cNvPr id="116" name="Oval 115">
-              <a:extLst>
-                <a:ext uri="{FF2B5EF4-FFF2-40B4-BE49-F238E27FC236}">
-                  <a16:creationId xmlns:a16="http://schemas.microsoft.com/office/drawing/2014/main" id="{6DDAF3DE-763C-751C-92CA-38D1B443779B}"/>
-                </a:ext>
-              </a:extLst>
-            </p:cNvPr>
-            <p:cNvSpPr/>
-            <p:nvPr/>
-          </p:nvSpPr>
-          <p:spPr>
-            <a:xfrm>
-              <a:off x="7043872" y="2851347"/>
-              <a:ext cx="167425" cy="167425"/>
-            </a:xfrm>
-            <a:prstGeom prst="ellipse">
-              <a:avLst/>
-            </a:prstGeom>
-            <a:pattFill prst="smGrid">
-              <a:fgClr>
-                <a:srgbClr val="FF0000"/>
-              </a:fgClr>
-              <a:bgClr>
-                <a:schemeClr val="bg1"/>
-              </a:bgClr>
-            </a:pattFill>
-          </p:spPr>
-          <p:style>
-            <a:lnRef idx="2">
-              <a:schemeClr val="accent1">
-                <a:shade val="50000"/>
-              </a:schemeClr>
-            </a:lnRef>
-            <a:fillRef idx="1">
-              <a:schemeClr val="accent1"/>
-            </a:fillRef>
-            <a:effectRef idx="0">
-              <a:schemeClr val="accent1"/>
-            </a:effectRef>
-            <a:fontRef idx="minor">
-              <a:schemeClr val="lt1"/>
-            </a:fontRef>
-          </p:style>
-          <p:txBody>
-            <a:bodyPr rtlCol="0" anchor="ctr"/>
-            <a:lstStyle/>
-            <a:p>
-              <a:pPr algn="ctr"/>
-              <a:endParaRPr lang="en-GB"/>
-            </a:p>
-          </p:txBody>
-        </p:sp>
-        <p:sp>
-          <p:nvSpPr>
-            <p:cNvPr id="117" name="Oval 116">
-              <a:extLst>
-                <a:ext uri="{FF2B5EF4-FFF2-40B4-BE49-F238E27FC236}">
-                  <a16:creationId xmlns:a16="http://schemas.microsoft.com/office/drawing/2014/main" id="{AC507E41-FE47-8961-7956-C6C727E8CDFA}"/>
-                </a:ext>
-              </a:extLst>
-            </p:cNvPr>
-            <p:cNvSpPr/>
-            <p:nvPr/>
-          </p:nvSpPr>
-          <p:spPr>
-            <a:xfrm>
-              <a:off x="7616363" y="2719374"/>
-              <a:ext cx="167425" cy="167425"/>
-            </a:xfrm>
-            <a:prstGeom prst="ellipse">
-              <a:avLst/>
-            </a:prstGeom>
-            <a:pattFill prst="smGrid">
-              <a:fgClr>
-                <a:srgbClr val="FF0000"/>
-              </a:fgClr>
-              <a:bgClr>
-                <a:schemeClr val="bg1"/>
-              </a:bgClr>
-            </a:pattFill>
-          </p:spPr>
-          <p:style>
-            <a:lnRef idx="2">
-              <a:schemeClr val="accent1">
-                <a:shade val="50000"/>
-              </a:schemeClr>
-            </a:lnRef>
-            <a:fillRef idx="1">
-              <a:schemeClr val="accent1"/>
-            </a:fillRef>
-            <a:effectRef idx="0">
-              <a:schemeClr val="accent1"/>
-            </a:effectRef>
-            <a:fontRef idx="minor">
-              <a:schemeClr val="lt1"/>
-            </a:fontRef>
-          </p:style>
-          <p:txBody>
-            <a:bodyPr rtlCol="0" anchor="ctr"/>
-            <a:lstStyle/>
-            <a:p>
-              <a:pPr algn="ctr"/>
-              <a:endParaRPr lang="en-GB"/>
-            </a:p>
-          </p:txBody>
-        </p:sp>
-        <p:sp>
-          <p:nvSpPr>
-            <p:cNvPr id="118" name="Oval 117">
-              <a:extLst>
-                <a:ext uri="{FF2B5EF4-FFF2-40B4-BE49-F238E27FC236}">
-                  <a16:creationId xmlns:a16="http://schemas.microsoft.com/office/drawing/2014/main" id="{C2CC41F3-B264-0B8A-5E1A-24E320E88CB9}"/>
-                </a:ext>
-              </a:extLst>
-            </p:cNvPr>
-            <p:cNvSpPr/>
-            <p:nvPr/>
-          </p:nvSpPr>
-          <p:spPr>
-            <a:xfrm>
-              <a:off x="7056131" y="3703178"/>
-              <a:ext cx="167425" cy="167425"/>
-            </a:xfrm>
-            <a:prstGeom prst="ellipse">
-              <a:avLst/>
-            </a:prstGeom>
-            <a:pattFill prst="smGrid">
-              <a:fgClr>
-                <a:srgbClr val="FF0000"/>
-              </a:fgClr>
-              <a:bgClr>
-                <a:schemeClr val="bg1"/>
-              </a:bgClr>
-            </a:pattFill>
-          </p:spPr>
-          <p:style>
-            <a:lnRef idx="2">
-              <a:schemeClr val="accent1">
-                <a:shade val="50000"/>
-              </a:schemeClr>
-            </a:lnRef>
-            <a:fillRef idx="1">
-              <a:schemeClr val="accent1"/>
-            </a:fillRef>
-            <a:effectRef idx="0">
-              <a:schemeClr val="accent1"/>
-            </a:effectRef>
-            <a:fontRef idx="minor">
-              <a:schemeClr val="lt1"/>
-            </a:fontRef>
-          </p:style>
-          <p:txBody>
-            <a:bodyPr rtlCol="0" anchor="ctr"/>
-            <a:lstStyle/>
-            <a:p>
-              <a:pPr algn="ctr"/>
-              <a:endParaRPr lang="en-GB"/>
-            </a:p>
-          </p:txBody>
-        </p:sp>
-        <p:sp>
-          <p:nvSpPr>
-            <p:cNvPr id="119" name="Oval 118">
-              <a:extLst>
-                <a:ext uri="{FF2B5EF4-FFF2-40B4-BE49-F238E27FC236}">
-                  <a16:creationId xmlns:a16="http://schemas.microsoft.com/office/drawing/2014/main" id="{D42694E2-0EA0-3EB7-6C84-F4E12144A5ED}"/>
-                </a:ext>
-              </a:extLst>
-            </p:cNvPr>
-            <p:cNvSpPr/>
-            <p:nvPr/>
-          </p:nvSpPr>
-          <p:spPr>
-            <a:xfrm>
-              <a:off x="7717904" y="3343315"/>
-              <a:ext cx="167425" cy="167425"/>
-            </a:xfrm>
-            <a:prstGeom prst="ellipse">
-              <a:avLst/>
-            </a:prstGeom>
-            <a:pattFill prst="smGrid">
-              <a:fgClr>
-                <a:srgbClr val="FF0000"/>
-              </a:fgClr>
-              <a:bgClr>
-                <a:schemeClr val="bg1"/>
-              </a:bgClr>
-            </a:pattFill>
-          </p:spPr>
-          <p:style>
-            <a:lnRef idx="2">
-              <a:schemeClr val="accent1">
-                <a:shade val="50000"/>
-              </a:schemeClr>
-            </a:lnRef>
-            <a:fillRef idx="1">
-              <a:schemeClr val="accent1"/>
-            </a:fillRef>
-            <a:effectRef idx="0">
-              <a:schemeClr val="accent1"/>
-            </a:effectRef>
-            <a:fontRef idx="minor">
-              <a:schemeClr val="lt1"/>
-            </a:fontRef>
-          </p:style>
-          <p:txBody>
-            <a:bodyPr rtlCol="0" anchor="ctr"/>
-            <a:lstStyle/>
-            <a:p>
-              <a:pPr algn="ctr"/>
-              <a:endParaRPr lang="en-GB"/>
-            </a:p>
-          </p:txBody>
-        </p:sp>
-        <p:cxnSp>
-          <p:nvCxnSpPr>
-            <p:cNvPr id="122" name="Straight Connector 121">
-              <a:extLst>
-                <a:ext uri="{FF2B5EF4-FFF2-40B4-BE49-F238E27FC236}">
-                  <a16:creationId xmlns:a16="http://schemas.microsoft.com/office/drawing/2014/main" id="{6723B20E-FD99-272B-2D68-5B51DC0F9D4C}"/>
-                </a:ext>
-              </a:extLst>
-            </p:cNvPr>
-            <p:cNvCxnSpPr>
-              <a:cxnSpLocks/>
-              <a:stCxn id="118" idx="7"/>
-              <a:endCxn id="117" idx="4"/>
-            </p:cNvCxnSpPr>
-            <p:nvPr/>
-          </p:nvCxnSpPr>
-          <p:spPr>
-            <a:xfrm flipV="1">
-              <a:off x="7199037" y="2886799"/>
-              <a:ext cx="501039" cy="840898"/>
-            </a:xfrm>
-            <a:prstGeom prst="line">
-              <a:avLst/>
-            </a:prstGeom>
-            <a:ln w="12700"/>
-          </p:spPr>
-          <p:style>
-            <a:lnRef idx="1">
-              <a:schemeClr val="accent1"/>
-            </a:lnRef>
-            <a:fillRef idx="0">
-              <a:schemeClr val="accent1"/>
-            </a:fillRef>
-            <a:effectRef idx="0">
-              <a:schemeClr val="accent1"/>
-            </a:effectRef>
-            <a:fontRef idx="minor">
-              <a:schemeClr val="tx1"/>
-            </a:fontRef>
-          </p:style>
-        </p:cxnSp>
-        <p:cxnSp>
-          <p:nvCxnSpPr>
-            <p:cNvPr id="126" name="Straight Connector 125">
-              <a:extLst>
-                <a:ext uri="{FF2B5EF4-FFF2-40B4-BE49-F238E27FC236}">
-                  <a16:creationId xmlns:a16="http://schemas.microsoft.com/office/drawing/2014/main" id="{5768E719-F435-9156-D08C-A93F14A27C65}"/>
-                </a:ext>
-              </a:extLst>
-            </p:cNvPr>
-            <p:cNvCxnSpPr>
-              <a:cxnSpLocks/>
-              <a:stCxn id="115" idx="6"/>
-              <a:endCxn id="116" idx="2"/>
-            </p:cNvCxnSpPr>
-            <p:nvPr/>
-          </p:nvCxnSpPr>
-          <p:spPr>
-            <a:xfrm flipV="1">
-              <a:off x="6607505" y="2935060"/>
-              <a:ext cx="436367" cy="41912"/>
-            </a:xfrm>
-            <a:prstGeom prst="line">
-              <a:avLst/>
-            </a:prstGeom>
-            <a:ln w="12700"/>
-          </p:spPr>
-          <p:style>
-            <a:lnRef idx="1">
-              <a:schemeClr val="accent1"/>
-            </a:lnRef>
-            <a:fillRef idx="0">
-              <a:schemeClr val="accent1"/>
-            </a:fillRef>
-            <a:effectRef idx="0">
-              <a:schemeClr val="accent1"/>
-            </a:effectRef>
-            <a:fontRef idx="minor">
-              <a:schemeClr val="tx1"/>
-            </a:fontRef>
-          </p:style>
-        </p:cxnSp>
-        <p:cxnSp>
-          <p:nvCxnSpPr>
-            <p:cNvPr id="129" name="Straight Connector 128">
-              <a:extLst>
-                <a:ext uri="{FF2B5EF4-FFF2-40B4-BE49-F238E27FC236}">
-                  <a16:creationId xmlns:a16="http://schemas.microsoft.com/office/drawing/2014/main" id="{4284079C-C30D-223F-76AF-0D1E4246DAD8}"/>
-                </a:ext>
-              </a:extLst>
-            </p:cNvPr>
-            <p:cNvCxnSpPr>
-              <a:cxnSpLocks/>
-              <a:stCxn id="119" idx="3"/>
-            </p:cNvCxnSpPr>
-            <p:nvPr/>
-          </p:nvCxnSpPr>
-          <p:spPr>
-            <a:xfrm flipH="1">
-              <a:off x="7199037" y="3486221"/>
-              <a:ext cx="543386" cy="342581"/>
-            </a:xfrm>
-            <a:prstGeom prst="line">
-              <a:avLst/>
-            </a:prstGeom>
-            <a:ln w="12700"/>
-          </p:spPr>
-          <p:style>
-            <a:lnRef idx="1">
-              <a:schemeClr val="accent1"/>
-            </a:lnRef>
-            <a:fillRef idx="0">
-              <a:schemeClr val="accent1"/>
-            </a:fillRef>
-            <a:effectRef idx="0">
-              <a:schemeClr val="accent1"/>
-            </a:effectRef>
-            <a:fontRef idx="minor">
-              <a:schemeClr val="tx1"/>
-            </a:fontRef>
-          </p:style>
-        </p:cxnSp>
-        <p:cxnSp>
-          <p:nvCxnSpPr>
-            <p:cNvPr id="132" name="Straight Connector 131">
-              <a:extLst>
-                <a:ext uri="{FF2B5EF4-FFF2-40B4-BE49-F238E27FC236}">
-                  <a16:creationId xmlns:a16="http://schemas.microsoft.com/office/drawing/2014/main" id="{42426DA9-DDBC-C099-C203-3AFC3BEDC16A}"/>
-                </a:ext>
-              </a:extLst>
-            </p:cNvPr>
-            <p:cNvCxnSpPr>
-              <a:cxnSpLocks/>
-              <a:stCxn id="115" idx="5"/>
-              <a:endCxn id="118" idx="2"/>
-            </p:cNvCxnSpPr>
-            <p:nvPr/>
-          </p:nvCxnSpPr>
-          <p:spPr>
-            <a:xfrm>
-              <a:off x="6582986" y="3036165"/>
-              <a:ext cx="473145" cy="750726"/>
-            </a:xfrm>
-            <a:prstGeom prst="line">
-              <a:avLst/>
-            </a:prstGeom>
-            <a:ln w="12700"/>
-          </p:spPr>
-          <p:style>
-            <a:lnRef idx="1">
-              <a:schemeClr val="accent1"/>
-            </a:lnRef>
-            <a:fillRef idx="0">
-              <a:schemeClr val="accent1"/>
-            </a:fillRef>
-            <a:effectRef idx="0">
-              <a:schemeClr val="accent1"/>
-            </a:effectRef>
-            <a:fontRef idx="minor">
-              <a:schemeClr val="tx1"/>
-            </a:fontRef>
-          </p:style>
-        </p:cxnSp>
-        <p:cxnSp>
-          <p:nvCxnSpPr>
-            <p:cNvPr id="136" name="Straight Connector 135">
-              <a:extLst>
-                <a:ext uri="{FF2B5EF4-FFF2-40B4-BE49-F238E27FC236}">
-                  <a16:creationId xmlns:a16="http://schemas.microsoft.com/office/drawing/2014/main" id="{E7EBC8D6-474F-5869-1ABB-A7DA435A4B05}"/>
-                </a:ext>
-              </a:extLst>
-            </p:cNvPr>
-            <p:cNvCxnSpPr>
-              <a:cxnSpLocks/>
-              <a:stCxn id="119" idx="0"/>
-              <a:endCxn id="117" idx="5"/>
-            </p:cNvCxnSpPr>
-            <p:nvPr/>
-          </p:nvCxnSpPr>
-          <p:spPr>
-            <a:xfrm flipH="1" flipV="1">
-              <a:off x="7759269" y="2862280"/>
-              <a:ext cx="42348" cy="481035"/>
-            </a:xfrm>
-            <a:prstGeom prst="line">
-              <a:avLst/>
-            </a:prstGeom>
-            <a:ln w="12700"/>
-          </p:spPr>
-          <p:style>
-            <a:lnRef idx="1">
-              <a:schemeClr val="accent1"/>
-            </a:lnRef>
-            <a:fillRef idx="0">
-              <a:schemeClr val="accent1"/>
-            </a:fillRef>
-            <a:effectRef idx="0">
-              <a:schemeClr val="accent1"/>
-            </a:effectRef>
-            <a:fontRef idx="minor">
-              <a:schemeClr val="tx1"/>
-            </a:fontRef>
-          </p:style>
-        </p:cxnSp>
-        <p:cxnSp>
-          <p:nvCxnSpPr>
-            <p:cNvPr id="148" name="Straight Connector 147">
-              <a:extLst>
-                <a:ext uri="{FF2B5EF4-FFF2-40B4-BE49-F238E27FC236}">
-                  <a16:creationId xmlns:a16="http://schemas.microsoft.com/office/drawing/2014/main" id="{3314D38B-17CE-6E10-499B-6E189EB48A61}"/>
-                </a:ext>
-              </a:extLst>
-            </p:cNvPr>
-            <p:cNvCxnSpPr>
-              <a:cxnSpLocks/>
-              <a:stCxn id="119" idx="1"/>
-              <a:endCxn id="116" idx="6"/>
-            </p:cNvCxnSpPr>
-            <p:nvPr/>
-          </p:nvCxnSpPr>
-          <p:spPr>
-            <a:xfrm flipH="1" flipV="1">
-              <a:off x="7211297" y="2935060"/>
-              <a:ext cx="531126" cy="432774"/>
-            </a:xfrm>
-            <a:prstGeom prst="line">
-              <a:avLst/>
-            </a:prstGeom>
-            <a:ln w="12700"/>
-          </p:spPr>
-          <p:style>
-            <a:lnRef idx="1">
-              <a:schemeClr val="accent1"/>
-            </a:lnRef>
-            <a:fillRef idx="0">
-              <a:schemeClr val="accent1"/>
-            </a:fillRef>
-            <a:effectRef idx="0">
-              <a:schemeClr val="accent1"/>
-            </a:effectRef>
-            <a:fontRef idx="minor">
-              <a:schemeClr val="tx1"/>
-            </a:fontRef>
-          </p:style>
-        </p:cxnSp>
-        <p:cxnSp>
-          <p:nvCxnSpPr>
-            <p:cNvPr id="153" name="Straight Connector 152">
-              <a:extLst>
-                <a:ext uri="{FF2B5EF4-FFF2-40B4-BE49-F238E27FC236}">
-                  <a16:creationId xmlns:a16="http://schemas.microsoft.com/office/drawing/2014/main" id="{E5AFFFB1-0A28-38A7-BC7A-A1DDA3B73480}"/>
-                </a:ext>
-              </a:extLst>
-            </p:cNvPr>
-            <p:cNvCxnSpPr>
-              <a:cxnSpLocks/>
-              <a:stCxn id="115" idx="5"/>
-              <a:endCxn id="119" idx="2"/>
-            </p:cNvCxnSpPr>
-            <p:nvPr/>
-          </p:nvCxnSpPr>
-          <p:spPr>
-            <a:xfrm>
-              <a:off x="6582986" y="3036165"/>
-              <a:ext cx="1134918" cy="390863"/>
-            </a:xfrm>
-            <a:prstGeom prst="line">
-              <a:avLst/>
-            </a:prstGeom>
-            <a:ln w="12700"/>
-          </p:spPr>
-          <p:style>
-            <a:lnRef idx="1">
-              <a:schemeClr val="accent1"/>
-            </a:lnRef>
-            <a:fillRef idx="0">
-              <a:schemeClr val="accent1"/>
-            </a:fillRef>
-            <a:effectRef idx="0">
-              <a:schemeClr val="accent1"/>
-            </a:effectRef>
-            <a:fontRef idx="minor">
-              <a:schemeClr val="tx1"/>
-            </a:fontRef>
-          </p:style>
-        </p:cxnSp>
-        <p:sp>
-          <p:nvSpPr>
-            <p:cNvPr id="157" name="TextBox 156">
-              <a:extLst>
-                <a:ext uri="{FF2B5EF4-FFF2-40B4-BE49-F238E27FC236}">
-                  <a16:creationId xmlns:a16="http://schemas.microsoft.com/office/drawing/2014/main" id="{75523CDC-70B2-29A0-0AA6-CA05E2B156A9}"/>
-                </a:ext>
-              </a:extLst>
-            </p:cNvPr>
-            <p:cNvSpPr txBox="1"/>
-            <p:nvPr/>
-          </p:nvSpPr>
-          <p:spPr>
-            <a:xfrm>
-              <a:off x="6297458" y="2233003"/>
-              <a:ext cx="1587871" cy="307777"/>
-            </a:xfrm>
-            <a:prstGeom prst="rect">
-              <a:avLst/>
-            </a:prstGeom>
-            <a:noFill/>
-          </p:spPr>
-          <p:txBody>
-            <a:bodyPr wrap="none" rtlCol="0">
-              <a:spAutoFit/>
-            </a:bodyPr>
-            <a:lstStyle/>
-            <a:p>
-              <a:r>
-                <a:rPr lang="en-GB" sz="1400" i="1" dirty="0"/>
-                <a:t>App-3 sub-network</a:t>
-              </a:r>
-            </a:p>
-          </p:txBody>
-        </p:sp>
-      </p:grpSp>
-      <p:grpSp>
-        <p:nvGrpSpPr>
-          <p:cNvPr id="2" name="Group 1">
-            <a:extLst>
-              <a:ext uri="{FF2B5EF4-FFF2-40B4-BE49-F238E27FC236}">
-                <a16:creationId xmlns:a16="http://schemas.microsoft.com/office/drawing/2014/main" id="{928677AA-61A3-40B4-437A-A676B61F8585}"/>
-              </a:ext>
-            </a:extLst>
-          </p:cNvPr>
-          <p:cNvGrpSpPr/>
-          <p:nvPr/>
-        </p:nvGrpSpPr>
-        <p:grpSpPr>
-          <a:xfrm>
-            <a:off x="4457737" y="1910443"/>
-            <a:ext cx="3589428" cy="385745"/>
-            <a:chOff x="3420586" y="1637713"/>
-            <a:chExt cx="3589428" cy="385745"/>
-          </a:xfrm>
-        </p:grpSpPr>
-        <p:sp>
-          <p:nvSpPr>
-            <p:cNvPr id="158" name="Oval 157">
-              <a:extLst>
-                <a:ext uri="{FF2B5EF4-FFF2-40B4-BE49-F238E27FC236}">
-                  <a16:creationId xmlns:a16="http://schemas.microsoft.com/office/drawing/2014/main" id="{7178F742-8CD8-E18F-D3CF-6728D6A8ACA4}"/>
-                </a:ext>
-              </a:extLst>
-            </p:cNvPr>
-            <p:cNvSpPr/>
-            <p:nvPr/>
-          </p:nvSpPr>
-          <p:spPr>
-            <a:xfrm>
-              <a:off x="3516768" y="1730711"/>
-              <a:ext cx="167425" cy="167425"/>
-            </a:xfrm>
-            <a:prstGeom prst="ellipse">
-              <a:avLst/>
-            </a:prstGeom>
-            <a:solidFill>
-              <a:schemeClr val="tx1"/>
-            </a:solidFill>
-          </p:spPr>
-          <p:style>
-            <a:lnRef idx="2">
-              <a:schemeClr val="accent1">
-                <a:shade val="50000"/>
-              </a:schemeClr>
-            </a:lnRef>
-            <a:fillRef idx="1">
-              <a:schemeClr val="accent1"/>
-            </a:fillRef>
-            <a:effectRef idx="0">
-              <a:schemeClr val="accent1"/>
-            </a:effectRef>
-            <a:fontRef idx="minor">
-              <a:schemeClr val="lt1"/>
-            </a:fontRef>
-          </p:style>
-          <p:txBody>
-            <a:bodyPr rtlCol="0" anchor="ctr"/>
-            <a:lstStyle/>
-            <a:p>
-              <a:pPr algn="ctr"/>
-              <a:endParaRPr lang="en-GB"/>
-            </a:p>
-          </p:txBody>
-        </p:sp>
-        <p:sp>
-          <p:nvSpPr>
-            <p:cNvPr id="159" name="TextBox 158">
-              <a:extLst>
-                <a:ext uri="{FF2B5EF4-FFF2-40B4-BE49-F238E27FC236}">
-                  <a16:creationId xmlns:a16="http://schemas.microsoft.com/office/drawing/2014/main" id="{3185B08B-D863-D258-1A46-4B2772DFEF20}"/>
-                </a:ext>
-              </a:extLst>
-            </p:cNvPr>
-            <p:cNvSpPr txBox="1"/>
-            <p:nvPr/>
-          </p:nvSpPr>
-          <p:spPr>
-            <a:xfrm>
-              <a:off x="3689685" y="1679804"/>
-              <a:ext cx="940257" cy="276999"/>
-            </a:xfrm>
-            <a:prstGeom prst="rect">
-              <a:avLst/>
-            </a:prstGeom>
-            <a:noFill/>
-          </p:spPr>
-          <p:txBody>
-            <a:bodyPr wrap="none" rtlCol="0">
-              <a:spAutoFit/>
-            </a:bodyPr>
-            <a:lstStyle/>
-            <a:p>
-              <a:r>
-                <a:rPr lang="en-GB" sz="1200" dirty="0"/>
-                <a:t>App-1 peers</a:t>
-              </a:r>
-            </a:p>
-          </p:txBody>
-        </p:sp>
-        <p:sp>
-          <p:nvSpPr>
-            <p:cNvPr id="161" name="TextBox 160">
-              <a:extLst>
-                <a:ext uri="{FF2B5EF4-FFF2-40B4-BE49-F238E27FC236}">
-                  <a16:creationId xmlns:a16="http://schemas.microsoft.com/office/drawing/2014/main" id="{F6772C8D-A62A-5973-D459-CC0C25D1801F}"/>
-                </a:ext>
-              </a:extLst>
-            </p:cNvPr>
-            <p:cNvSpPr txBox="1"/>
-            <p:nvPr/>
-          </p:nvSpPr>
-          <p:spPr>
-            <a:xfrm>
-              <a:off x="4899041" y="1668223"/>
-              <a:ext cx="940257" cy="276999"/>
-            </a:xfrm>
-            <a:prstGeom prst="rect">
-              <a:avLst/>
-            </a:prstGeom>
-            <a:noFill/>
-          </p:spPr>
-          <p:txBody>
-            <a:bodyPr wrap="none" rtlCol="0">
-              <a:spAutoFit/>
-            </a:bodyPr>
-            <a:lstStyle/>
-            <a:p>
-              <a:r>
-                <a:rPr lang="en-GB" sz="1200" dirty="0"/>
-                <a:t>App-2 peers</a:t>
-              </a:r>
-            </a:p>
-          </p:txBody>
-        </p:sp>
-        <p:sp>
-          <p:nvSpPr>
-            <p:cNvPr id="162" name="Oval 161">
-              <a:extLst>
-                <a:ext uri="{FF2B5EF4-FFF2-40B4-BE49-F238E27FC236}">
-                  <a16:creationId xmlns:a16="http://schemas.microsoft.com/office/drawing/2014/main" id="{B9A41E6A-3FD1-3474-BC32-33453A3E60E6}"/>
-                </a:ext>
-              </a:extLst>
-            </p:cNvPr>
-            <p:cNvSpPr/>
-            <p:nvPr/>
-          </p:nvSpPr>
-          <p:spPr>
-            <a:xfrm>
-              <a:off x="5894718" y="1699306"/>
-              <a:ext cx="167425" cy="167425"/>
-            </a:xfrm>
-            <a:prstGeom prst="ellipse">
-              <a:avLst/>
-            </a:prstGeom>
-            <a:pattFill prst="smGrid">
-              <a:fgClr>
-                <a:srgbClr val="FF0000"/>
-              </a:fgClr>
-              <a:bgClr>
-                <a:schemeClr val="bg1"/>
-              </a:bgClr>
-            </a:pattFill>
-          </p:spPr>
-          <p:style>
-            <a:lnRef idx="2">
-              <a:schemeClr val="accent1">
-                <a:shade val="50000"/>
-              </a:schemeClr>
-            </a:lnRef>
-            <a:fillRef idx="1">
-              <a:schemeClr val="accent1"/>
-            </a:fillRef>
-            <a:effectRef idx="0">
-              <a:schemeClr val="accent1"/>
-            </a:effectRef>
-            <a:fontRef idx="minor">
-              <a:schemeClr val="lt1"/>
-            </a:fontRef>
-          </p:style>
-          <p:txBody>
-            <a:bodyPr rtlCol="0" anchor="ctr"/>
-            <a:lstStyle/>
-            <a:p>
-              <a:pPr algn="ctr"/>
-              <a:endParaRPr lang="en-GB"/>
-            </a:p>
-          </p:txBody>
-        </p:sp>
-        <p:sp>
-          <p:nvSpPr>
-            <p:cNvPr id="163" name="Oval 162">
-              <a:extLst>
-                <a:ext uri="{FF2B5EF4-FFF2-40B4-BE49-F238E27FC236}">
-                  <a16:creationId xmlns:a16="http://schemas.microsoft.com/office/drawing/2014/main" id="{8B018A8A-E44D-6B45-26B8-C9F7151EA6C2}"/>
-                </a:ext>
-              </a:extLst>
-            </p:cNvPr>
-            <p:cNvSpPr/>
-            <p:nvPr/>
-          </p:nvSpPr>
-          <p:spPr>
-            <a:xfrm>
-              <a:off x="4728593" y="1716340"/>
-              <a:ext cx="167425" cy="167425"/>
-            </a:xfrm>
-            <a:prstGeom prst="ellipse">
-              <a:avLst/>
-            </a:prstGeom>
-            <a:pattFill prst="wdUpDiag">
-              <a:fgClr>
-                <a:srgbClr val="00B050"/>
-              </a:fgClr>
-              <a:bgClr>
-                <a:schemeClr val="bg1"/>
-              </a:bgClr>
-            </a:pattFill>
-          </p:spPr>
-          <p:style>
-            <a:lnRef idx="2">
-              <a:schemeClr val="accent1">
-                <a:shade val="50000"/>
-              </a:schemeClr>
-            </a:lnRef>
-            <a:fillRef idx="1">
-              <a:schemeClr val="accent1"/>
-            </a:fillRef>
-            <a:effectRef idx="0">
-              <a:schemeClr val="accent1"/>
-            </a:effectRef>
-            <a:fontRef idx="minor">
-              <a:schemeClr val="lt1"/>
-            </a:fontRef>
-          </p:style>
-          <p:txBody>
-            <a:bodyPr rtlCol="0" anchor="ctr"/>
-            <a:lstStyle/>
-            <a:p>
-              <a:pPr algn="ctr"/>
-              <a:endParaRPr lang="en-GB"/>
-            </a:p>
-          </p:txBody>
-        </p:sp>
-        <p:sp>
-          <p:nvSpPr>
-            <p:cNvPr id="164" name="TextBox 163">
-              <a:extLst>
-                <a:ext uri="{FF2B5EF4-FFF2-40B4-BE49-F238E27FC236}">
-                  <a16:creationId xmlns:a16="http://schemas.microsoft.com/office/drawing/2014/main" id="{8AC067FC-4F17-3DA6-7B3F-26D1E7714AAC}"/>
-                </a:ext>
-              </a:extLst>
-            </p:cNvPr>
-            <p:cNvSpPr txBox="1"/>
-            <p:nvPr/>
-          </p:nvSpPr>
-          <p:spPr>
-            <a:xfrm>
-              <a:off x="6069757" y="1637713"/>
-              <a:ext cx="940257" cy="276999"/>
-            </a:xfrm>
-            <a:prstGeom prst="rect">
-              <a:avLst/>
-            </a:prstGeom>
-            <a:noFill/>
-          </p:spPr>
-          <p:txBody>
-            <a:bodyPr wrap="none" rtlCol="0">
-              <a:spAutoFit/>
-            </a:bodyPr>
-            <a:lstStyle/>
-            <a:p>
-              <a:r>
-                <a:rPr lang="en-GB" sz="1200" dirty="0"/>
-                <a:t>App-3 peers</a:t>
-              </a:r>
-            </a:p>
-          </p:txBody>
-        </p:sp>
-        <p:sp>
-          <p:nvSpPr>
-            <p:cNvPr id="165" name="Rectangle 164">
-              <a:extLst>
-                <a:ext uri="{FF2B5EF4-FFF2-40B4-BE49-F238E27FC236}">
-                  <a16:creationId xmlns:a16="http://schemas.microsoft.com/office/drawing/2014/main" id="{E381E640-23ED-E6FA-0216-7D2D86E99FF1}"/>
-                </a:ext>
-              </a:extLst>
-            </p:cNvPr>
-            <p:cNvSpPr/>
-            <p:nvPr/>
-          </p:nvSpPr>
-          <p:spPr>
-            <a:xfrm>
-              <a:off x="3420586" y="1644068"/>
-              <a:ext cx="3589428" cy="379390"/>
-            </a:xfrm>
-            <a:prstGeom prst="rect">
-              <a:avLst/>
-            </a:prstGeom>
-            <a:noFill/>
-            <a:ln>
-              <a:solidFill>
-                <a:schemeClr val="tx1"/>
-              </a:solidFill>
-              <a:prstDash val="sysDot"/>
-            </a:ln>
-          </p:spPr>
-          <p:style>
-            <a:lnRef idx="2">
-              <a:schemeClr val="accent1">
-                <a:shade val="50000"/>
-              </a:schemeClr>
-            </a:lnRef>
-            <a:fillRef idx="1">
-              <a:schemeClr val="accent1"/>
-            </a:fillRef>
-            <a:effectRef idx="0">
-              <a:schemeClr val="accent1"/>
-            </a:effectRef>
-            <a:fontRef idx="minor">
-              <a:schemeClr val="lt1"/>
-            </a:fontRef>
-          </p:style>
-          <p:txBody>
-            <a:bodyPr rtlCol="0" anchor="ctr"/>
-            <a:lstStyle/>
-            <a:p>
-              <a:pPr algn="ctr"/>
-              <a:endParaRPr lang="en-GB"/>
-            </a:p>
-          </p:txBody>
-        </p:sp>
-      </p:grpSp>
+            <a:prstDash val="sysDot"/>
+          </a:ln>
+        </p:spPr>
+        <p:style>
+          <a:lnRef idx="2">
+            <a:schemeClr val="accent1">
+              <a:shade val="50000"/>
+            </a:schemeClr>
+          </a:lnRef>
+          <a:fillRef idx="1">
+            <a:schemeClr val="accent1"/>
+          </a:fillRef>
+          <a:effectRef idx="0">
+            <a:schemeClr val="accent1"/>
+          </a:effectRef>
+          <a:fontRef idx="minor">
+            <a:schemeClr val="lt1"/>
+          </a:fontRef>
+        </p:style>
+        <p:txBody>
+          <a:bodyPr rtlCol="0" anchor="ctr"/>
+          <a:lstStyle/>
+          <a:p>
+            <a:pPr algn="ctr"/>
+            <a:endParaRPr lang="en-GB"/>
+          </a:p>
+        </p:txBody>
+      </p:sp>
       <p:cxnSp>
         <p:nvCxnSpPr>
           <p:cNvPr id="68" name="Straight Connector 67">
@@ -22516,7 +22474,7 @@
         </p:nvCxnSpPr>
         <p:spPr>
           <a:xfrm flipH="1" flipV="1">
-            <a:off x="7971707" y="3299679"/>
+            <a:off x="8261633" y="3299679"/>
             <a:ext cx="378791" cy="54751"/>
           </a:xfrm>
           <a:prstGeom prst="line">
@@ -22557,7 +22515,7 @@
         </p:nvCxnSpPr>
         <p:spPr>
           <a:xfrm flipV="1">
-            <a:off x="6760710" y="2896868"/>
+            <a:off x="6704955" y="2896868"/>
             <a:ext cx="309378" cy="601729"/>
           </a:xfrm>
           <a:prstGeom prst="line">
@@ -22594,10 +22552,10 @@
         </p:nvGrpSpPr>
         <p:grpSpPr>
           <a:xfrm>
-            <a:off x="149670" y="2302235"/>
-            <a:ext cx="5229613" cy="1210919"/>
-            <a:chOff x="175516" y="3241794"/>
-            <a:chExt cx="4744849" cy="1162779"/>
+            <a:off x="149670" y="2235323"/>
+            <a:ext cx="5229613" cy="1277825"/>
+            <a:chOff x="175516" y="3177546"/>
+            <a:chExt cx="4744849" cy="1227027"/>
           </a:xfrm>
         </p:grpSpPr>
         <p:sp>
@@ -24999,8 +24957,8 @@
           </p:nvSpPr>
           <p:spPr>
             <a:xfrm>
-              <a:off x="1861265" y="3243913"/>
-              <a:ext cx="250390" cy="246221"/>
+              <a:off x="1881499" y="3179672"/>
+              <a:ext cx="262086" cy="325095"/>
             </a:xfrm>
             <a:prstGeom prst="rect">
               <a:avLst/>
@@ -25014,7 +24972,7 @@
             <a:lstStyle/>
             <a:p>
               <a:r>
-                <a:rPr lang="en-GB" sz="1000" dirty="0"/>
+                <a:rPr lang="en-GB" sz="1600" dirty="0"/>
                 <a:t>0</a:t>
               </a:r>
             </a:p>
@@ -25034,8 +24992,8 @@
           </p:nvSpPr>
           <p:spPr>
             <a:xfrm>
-              <a:off x="3107796" y="3241794"/>
-              <a:ext cx="250390" cy="246221"/>
+              <a:off x="3128030" y="3177546"/>
+              <a:ext cx="262086" cy="325095"/>
             </a:xfrm>
             <a:prstGeom prst="rect">
               <a:avLst/>
@@ -25049,7 +25007,7 @@
             <a:lstStyle/>
             <a:p>
               <a:r>
-                <a:rPr lang="en-GB" sz="1000" dirty="0"/>
+                <a:rPr lang="en-GB" sz="1600" dirty="0"/>
                 <a:t>1</a:t>
               </a:r>
             </a:p>
@@ -25069,8 +25027,8 @@
           </p:nvSpPr>
           <p:spPr>
             <a:xfrm>
-              <a:off x="877750" y="3600968"/>
-              <a:ext cx="250390" cy="246221"/>
+              <a:off x="897985" y="3536726"/>
+              <a:ext cx="262086" cy="325095"/>
             </a:xfrm>
             <a:prstGeom prst="rect">
               <a:avLst/>
@@ -25084,7 +25042,7 @@
             <a:lstStyle/>
             <a:p>
               <a:r>
-                <a:rPr lang="en-GB" sz="1000" dirty="0"/>
+                <a:rPr lang="en-GB" sz="1600" dirty="0"/>
                 <a:t>0</a:t>
               </a:r>
             </a:p>
@@ -25104,8 +25062,8 @@
           </p:nvSpPr>
           <p:spPr>
             <a:xfrm>
-              <a:off x="1649176" y="3598866"/>
-              <a:ext cx="250390" cy="246221"/>
+              <a:off x="1669410" y="3534624"/>
+              <a:ext cx="262086" cy="325095"/>
             </a:xfrm>
             <a:prstGeom prst="rect">
               <a:avLst/>
@@ -25119,7 +25077,7 @@
             <a:lstStyle/>
             <a:p>
               <a:r>
-                <a:rPr lang="en-GB" sz="1000" dirty="0"/>
+                <a:rPr lang="en-GB" sz="1600" dirty="0"/>
                 <a:t>1</a:t>
               </a:r>
             </a:p>
@@ -25139,8 +25097,8 @@
           </p:nvSpPr>
           <p:spPr>
             <a:xfrm>
-              <a:off x="3269924" y="3597087"/>
-              <a:ext cx="250390" cy="246221"/>
+              <a:off x="3290158" y="3532845"/>
+              <a:ext cx="262086" cy="325095"/>
             </a:xfrm>
             <a:prstGeom prst="rect">
               <a:avLst/>
@@ -25154,7 +25112,7 @@
             <a:lstStyle/>
             <a:p>
               <a:r>
-                <a:rPr lang="en-GB" sz="1000" dirty="0"/>
+                <a:rPr lang="en-GB" sz="1600" dirty="0"/>
                 <a:t>0</a:t>
               </a:r>
             </a:p>
@@ -25174,8 +25132,8 @@
           </p:nvSpPr>
           <p:spPr>
             <a:xfrm>
-              <a:off x="4127844" y="3595130"/>
-              <a:ext cx="250390" cy="246221"/>
+              <a:off x="4148079" y="3530882"/>
+              <a:ext cx="262086" cy="325095"/>
             </a:xfrm>
             <a:prstGeom prst="rect">
               <a:avLst/>
@@ -25189,7 +25147,7 @@
             <a:lstStyle/>
             <a:p>
               <a:r>
-                <a:rPr lang="en-GB" sz="1000" dirty="0"/>
+                <a:rPr lang="en-GB" sz="1600" dirty="0"/>
                 <a:t>1</a:t>
               </a:r>
             </a:p>
@@ -25209,8 +25167,8 @@
           </p:nvSpPr>
           <p:spPr>
             <a:xfrm>
-              <a:off x="379191" y="3834895"/>
-              <a:ext cx="250390" cy="246221"/>
+              <a:off x="399426" y="3770654"/>
+              <a:ext cx="262086" cy="325095"/>
             </a:xfrm>
             <a:prstGeom prst="rect">
               <a:avLst/>
@@ -25224,7 +25182,7 @@
             <a:lstStyle/>
             <a:p>
               <a:r>
-                <a:rPr lang="en-GB" sz="1000" dirty="0"/>
+                <a:rPr lang="en-GB" sz="1600" dirty="0"/>
                 <a:t>0</a:t>
               </a:r>
             </a:p>
@@ -25244,8 +25202,8 @@
           </p:nvSpPr>
           <p:spPr>
             <a:xfrm>
-              <a:off x="892526" y="3833092"/>
-              <a:ext cx="250390" cy="246221"/>
+              <a:off x="912760" y="3768850"/>
+              <a:ext cx="262086" cy="325095"/>
             </a:xfrm>
             <a:prstGeom prst="rect">
               <a:avLst/>
@@ -25259,7 +25217,7 @@
             <a:lstStyle/>
             <a:p>
               <a:r>
-                <a:rPr lang="en-GB" sz="1000" dirty="0"/>
+                <a:rPr lang="en-GB" sz="1600" dirty="0"/>
                 <a:t>1</a:t>
               </a:r>
             </a:p>
@@ -25279,8 +25237,8 @@
           </p:nvSpPr>
           <p:spPr>
             <a:xfrm>
-              <a:off x="1649901" y="3830390"/>
-              <a:ext cx="250390" cy="246221"/>
+              <a:off x="1670136" y="3766148"/>
+              <a:ext cx="262086" cy="325095"/>
             </a:xfrm>
             <a:prstGeom prst="rect">
               <a:avLst/>
@@ -25294,7 +25252,7 @@
             <a:lstStyle/>
             <a:p>
               <a:r>
-                <a:rPr lang="en-GB" sz="1000" dirty="0"/>
+                <a:rPr lang="en-GB" sz="1600" dirty="0"/>
                 <a:t>0</a:t>
               </a:r>
             </a:p>
@@ -25314,8 +25272,8 @@
           </p:nvSpPr>
           <p:spPr>
             <a:xfrm>
-              <a:off x="2098776" y="3850564"/>
-              <a:ext cx="250390" cy="246221"/>
+              <a:off x="2119010" y="3786323"/>
+              <a:ext cx="262086" cy="325095"/>
             </a:xfrm>
             <a:prstGeom prst="rect">
               <a:avLst/>
@@ -25329,7 +25287,7 @@
             <a:lstStyle/>
             <a:p>
               <a:r>
-                <a:rPr lang="en-GB" sz="1000" dirty="0"/>
+                <a:rPr lang="en-GB" sz="1600" dirty="0"/>
                 <a:t>1</a:t>
               </a:r>
             </a:p>
@@ -25349,8 +25307,8 @@
           </p:nvSpPr>
           <p:spPr>
             <a:xfrm>
-              <a:off x="2792243" y="3833662"/>
-              <a:ext cx="250390" cy="246221"/>
+              <a:off x="2812477" y="3769422"/>
+              <a:ext cx="262086" cy="325095"/>
             </a:xfrm>
             <a:prstGeom prst="rect">
               <a:avLst/>
@@ -25364,7 +25322,7 @@
             <a:lstStyle/>
             <a:p>
               <a:r>
-                <a:rPr lang="en-GB" sz="1000" dirty="0"/>
+                <a:rPr lang="en-GB" sz="1600" dirty="0"/>
                 <a:t>0</a:t>
               </a:r>
             </a:p>
@@ -25384,8 +25342,8 @@
           </p:nvSpPr>
           <p:spPr>
             <a:xfrm>
-              <a:off x="3319920" y="3830390"/>
-              <a:ext cx="250390" cy="246221"/>
+              <a:off x="3340154" y="3766148"/>
+              <a:ext cx="262086" cy="325095"/>
             </a:xfrm>
             <a:prstGeom prst="rect">
               <a:avLst/>
@@ -25399,7 +25357,7 @@
             <a:lstStyle/>
             <a:p>
               <a:r>
-                <a:rPr lang="en-GB" sz="1000" dirty="0"/>
+                <a:rPr lang="en-GB" sz="1600" dirty="0"/>
                 <a:t>1</a:t>
               </a:r>
             </a:p>
@@ -25419,8 +25377,8 @@
           </p:nvSpPr>
           <p:spPr>
             <a:xfrm>
-              <a:off x="3999550" y="3837885"/>
-              <a:ext cx="250390" cy="246221"/>
+              <a:off x="4019785" y="3773644"/>
+              <a:ext cx="262086" cy="325095"/>
             </a:xfrm>
             <a:prstGeom prst="rect">
               <a:avLst/>
@@ -25434,7 +25392,7 @@
             <a:lstStyle/>
             <a:p>
               <a:r>
-                <a:rPr lang="en-GB" sz="1000" dirty="0"/>
+                <a:rPr lang="en-GB" sz="1600" dirty="0"/>
                 <a:t>0</a:t>
               </a:r>
             </a:p>
@@ -25454,8 +25412,8 @@
           </p:nvSpPr>
           <p:spPr>
             <a:xfrm>
-              <a:off x="4523538" y="3837885"/>
-              <a:ext cx="250390" cy="246221"/>
+              <a:off x="4543773" y="3773644"/>
+              <a:ext cx="262086" cy="325095"/>
             </a:xfrm>
             <a:prstGeom prst="rect">
               <a:avLst/>
@@ -25469,7 +25427,7 @@
             <a:lstStyle/>
             <a:p>
               <a:r>
-                <a:rPr lang="en-GB" sz="1000" dirty="0"/>
+                <a:rPr lang="en-GB" sz="1600" dirty="0"/>
                 <a:t>1</a:t>
               </a:r>
             </a:p>
@@ -26714,7 +26672,7 @@
         </p:nvSpPr>
         <p:spPr>
           <a:xfrm>
-            <a:off x="5550618" y="2981269"/>
+            <a:off x="5418389" y="3197396"/>
             <a:ext cx="545382" cy="375659"/>
           </a:xfrm>
           <a:prstGeom prst="notchedRightArrow">
@@ -26760,8 +26718,8 @@
         </p:nvSpPr>
         <p:spPr>
           <a:xfrm>
-            <a:off x="2218997" y="4110322"/>
-            <a:ext cx="1244571" cy="276999"/>
+            <a:off x="2218997" y="4121473"/>
+            <a:ext cx="1595180" cy="338554"/>
           </a:xfrm>
           <a:prstGeom prst="rect">
             <a:avLst/>
@@ -26775,9 +26733,168 @@
           <a:lstStyle/>
           <a:p>
             <a:r>
-              <a:rPr lang="en-GB" sz="1200" dirty="0"/>
+              <a:rPr lang="en-GB" sz="1600" dirty="0"/>
               <a:t>DHT connections</a:t>
             </a:r>
+          </a:p>
+        </p:txBody>
+      </p:sp>
+      <p:sp>
+        <p:nvSpPr>
+          <p:cNvPr id="28" name="Rectangle 27">
+            <a:extLst>
+              <a:ext uri="{FF2B5EF4-FFF2-40B4-BE49-F238E27FC236}">
+                <a16:creationId xmlns:a16="http://schemas.microsoft.com/office/drawing/2014/main" id="{46AC0AE9-FB80-75DC-D49E-3F2F4193D463}"/>
+              </a:ext>
+            </a:extLst>
+          </p:cNvPr>
+          <p:cNvSpPr/>
+          <p:nvPr/>
+        </p:nvSpPr>
+        <p:spPr>
+          <a:xfrm>
+            <a:off x="6004080" y="2438920"/>
+            <a:ext cx="1675495" cy="1720941"/>
+          </a:xfrm>
+          <a:prstGeom prst="rect">
+            <a:avLst/>
+          </a:prstGeom>
+          <a:noFill/>
+          <a:ln>
+            <a:solidFill>
+              <a:schemeClr val="tx1"/>
+            </a:solidFill>
+            <a:prstDash val="sysDot"/>
+          </a:ln>
+        </p:spPr>
+        <p:style>
+          <a:lnRef idx="2">
+            <a:schemeClr val="accent1">
+              <a:shade val="50000"/>
+            </a:schemeClr>
+          </a:lnRef>
+          <a:fillRef idx="1">
+            <a:schemeClr val="accent1"/>
+          </a:fillRef>
+          <a:effectRef idx="0">
+            <a:schemeClr val="accent1"/>
+          </a:effectRef>
+          <a:fontRef idx="minor">
+            <a:schemeClr val="lt1"/>
+          </a:fontRef>
+        </p:style>
+        <p:txBody>
+          <a:bodyPr rtlCol="0" anchor="ctr"/>
+          <a:lstStyle/>
+          <a:p>
+            <a:pPr algn="ctr"/>
+            <a:endParaRPr lang="en-GB"/>
+          </a:p>
+        </p:txBody>
+      </p:sp>
+      <p:sp>
+        <p:nvSpPr>
+          <p:cNvPr id="30" name="Rectangle 29">
+            <a:extLst>
+              <a:ext uri="{FF2B5EF4-FFF2-40B4-BE49-F238E27FC236}">
+                <a16:creationId xmlns:a16="http://schemas.microsoft.com/office/drawing/2014/main" id="{C08AC86C-D15C-73D7-8CD5-B19A39CE24EC}"/>
+              </a:ext>
+            </a:extLst>
+          </p:cNvPr>
+          <p:cNvSpPr/>
+          <p:nvPr/>
+        </p:nvSpPr>
+        <p:spPr>
+          <a:xfrm>
+            <a:off x="7761837" y="2435755"/>
+            <a:ext cx="1675495" cy="1720941"/>
+          </a:xfrm>
+          <a:prstGeom prst="rect">
+            <a:avLst/>
+          </a:prstGeom>
+          <a:noFill/>
+          <a:ln>
+            <a:solidFill>
+              <a:schemeClr val="tx1"/>
+            </a:solidFill>
+            <a:prstDash val="sysDot"/>
+          </a:ln>
+        </p:spPr>
+        <p:style>
+          <a:lnRef idx="2">
+            <a:schemeClr val="accent1">
+              <a:shade val="50000"/>
+            </a:schemeClr>
+          </a:lnRef>
+          <a:fillRef idx="1">
+            <a:schemeClr val="accent1"/>
+          </a:fillRef>
+          <a:effectRef idx="0">
+            <a:schemeClr val="accent1"/>
+          </a:effectRef>
+          <a:fontRef idx="minor">
+            <a:schemeClr val="lt1"/>
+          </a:fontRef>
+        </p:style>
+        <p:txBody>
+          <a:bodyPr rtlCol="0" anchor="ctr"/>
+          <a:lstStyle/>
+          <a:p>
+            <a:pPr algn="ctr"/>
+            <a:endParaRPr lang="en-GB"/>
+          </a:p>
+        </p:txBody>
+      </p:sp>
+      <p:sp>
+        <p:nvSpPr>
+          <p:cNvPr id="31" name="Rectangle 30">
+            <a:extLst>
+              <a:ext uri="{FF2B5EF4-FFF2-40B4-BE49-F238E27FC236}">
+                <a16:creationId xmlns:a16="http://schemas.microsoft.com/office/drawing/2014/main" id="{4AD8274A-71C6-6C6F-C329-43EE6EF9ADE9}"/>
+              </a:ext>
+            </a:extLst>
+          </p:cNvPr>
+          <p:cNvSpPr/>
+          <p:nvPr/>
+        </p:nvSpPr>
+        <p:spPr>
+          <a:xfrm>
+            <a:off x="9528556" y="2435754"/>
+            <a:ext cx="1675495" cy="1720941"/>
+          </a:xfrm>
+          <a:prstGeom prst="rect">
+            <a:avLst/>
+          </a:prstGeom>
+          <a:noFill/>
+          <a:ln>
+            <a:solidFill>
+              <a:schemeClr val="tx1"/>
+            </a:solidFill>
+            <a:prstDash val="sysDot"/>
+          </a:ln>
+        </p:spPr>
+        <p:style>
+          <a:lnRef idx="2">
+            <a:schemeClr val="accent1">
+              <a:shade val="50000"/>
+            </a:schemeClr>
+          </a:lnRef>
+          <a:fillRef idx="1">
+            <a:schemeClr val="accent1"/>
+          </a:fillRef>
+          <a:effectRef idx="0">
+            <a:schemeClr val="accent1"/>
+          </a:effectRef>
+          <a:fontRef idx="minor">
+            <a:schemeClr val="lt1"/>
+          </a:fontRef>
+        </p:style>
+        <p:txBody>
+          <a:bodyPr rtlCol="0" anchor="ctr"/>
+          <a:lstStyle/>
+          <a:p>
+            <a:pPr algn="ctr"/>
+            <a:endParaRPr lang="en-GB"/>
           </a:p>
         </p:txBody>
       </p:sp>

</xml_diff>